<commit_message>
v22.1: A quick fix on the peak shaving iteration. Preventing the peak shaving to go through all of the trains one by one, but only the ones that are positive (omitting zero (e.g. coasting or stopped) or braking trains.)
</commit_message>
<xml_diff>
--- a/Reports/Train_with_PS capabilities_20250728.pptx
+++ b/Reports/Train_with_PS capabilities_20250728.pptx
@@ -3,10 +3,13 @@
 <p:presentation xmlns:a="http://schemas.openxmlformats.org/drawingml/2006/main" xmlns:r="http://schemas.openxmlformats.org/officeDocument/2006/relationships" xmlns:p="http://schemas.openxmlformats.org/presentationml/2006/main" saveSubsetFonts="1">
   <p:sldMasterIdLst>
     <p:sldMasterId id="2147483648" r:id="rId1"/>
+    <p:sldMasterId id="2147483924" r:id="rId2"/>
   </p:sldMasterIdLst>
   <p:sldIdLst>
-    <p:sldId id="257" r:id="rId2"/>
-    <p:sldId id="260" r:id="rId3"/>
+    <p:sldId id="261" r:id="rId3"/>
+    <p:sldId id="257" r:id="rId4"/>
+    <p:sldId id="260" r:id="rId5"/>
+    <p:sldId id="262" r:id="rId6"/>
   </p:sldIdLst>
   <p:sldSz cx="12192000" cy="6858000"/>
   <p:notesSz cx="6858000" cy="9144000"/>
@@ -105,13 +108,18 @@
       </a:defRPr>
     </a:lvl9pPr>
   </p:defaultTextStyle>
+  <p:extLst>
+    <p:ext uri="{EFAFB233-063F-42B5-8137-9DF3F51BA10A}">
+      <p15:sldGuideLst xmlns:p15="http://schemas.microsoft.com/office/powerpoint/2012/main"/>
+    </p:ext>
+  </p:extLst>
 </p:presentation>
 </file>
 
 <file path=ppt/revisionInfo.xml><?xml version="1.0" encoding="utf-8"?>
 <p1510:revInfo xmlns:a="http://schemas.openxmlformats.org/drawingml/2006/main" xmlns:r="http://schemas.openxmlformats.org/officeDocument/2006/relationships" xmlns:p1510="http://schemas.microsoft.com/office/powerpoint/2015/10/main">
   <p1510:revLst>
-    <p1510:client id="{72AF2A81-B5F1-4E69-8DE0-BB2C03A25C53}" v="971" dt="2025-07-28T13:49:01.137"/>
+    <p1510:client id="{72AF2A81-B5F1-4E69-8DE0-BB2C03A25C53}" v="983" dt="2025-07-29T13:59:37.850"/>
   </p1510:revLst>
 </p1510:revInfo>
 </file>
@@ -120,8 +128,8 @@
 <pc:chgInfo xmlns:a="http://schemas.openxmlformats.org/drawingml/2006/main" xmlns:r="http://schemas.openxmlformats.org/officeDocument/2006/relationships" xmlns:ac="http://schemas.microsoft.com/office/drawing/2013/main/command" xmlns:pc="http://schemas.microsoft.com/office/powerpoint/2013/main/command">
   <pc:docChgLst>
     <pc:chgData name="Darbandi, Hamed (UT-EEMCS)" userId="14c3e4a7-a657-4d7f-849e-8baaf4839630" providerId="ADAL" clId="{72AF2A81-B5F1-4E69-8DE0-BB2C03A25C53}"/>
-    <pc:docChg chg="undo redo custSel addSld delSld modSld">
-      <pc:chgData name="Darbandi, Hamed (UT-EEMCS)" userId="14c3e4a7-a657-4d7f-849e-8baaf4839630" providerId="ADAL" clId="{72AF2A81-B5F1-4E69-8DE0-BB2C03A25C53}" dt="2025-07-28T13:49:01.137" v="1020" actId="20577"/>
+    <pc:docChg chg="undo redo custSel addSld delSld modSld sldOrd addMainMaster">
+      <pc:chgData name="Darbandi, Hamed (UT-EEMCS)" userId="14c3e4a7-a657-4d7f-849e-8baaf4839630" providerId="ADAL" clId="{72AF2A81-B5F1-4E69-8DE0-BB2C03A25C53}" dt="2025-07-29T13:59:48.554" v="1143" actId="20577"/>
       <pc:docMkLst>
         <pc:docMk/>
       </pc:docMkLst>
@@ -256,6 +264,170 @@
           </ac:graphicFrameMkLst>
         </pc:graphicFrameChg>
       </pc:sldChg>
+      <pc:sldChg chg="modSp add mod ord">
+        <pc:chgData name="Darbandi, Hamed (UT-EEMCS)" userId="14c3e4a7-a657-4d7f-849e-8baaf4839630" providerId="ADAL" clId="{72AF2A81-B5F1-4E69-8DE0-BB2C03A25C53}" dt="2025-07-29T10:10:40.884" v="1077" actId="20577"/>
+        <pc:sldMkLst>
+          <pc:docMk/>
+          <pc:sldMk cId="2289031963" sldId="261"/>
+        </pc:sldMkLst>
+        <pc:spChg chg="mod">
+          <ac:chgData name="Darbandi, Hamed (UT-EEMCS)" userId="14c3e4a7-a657-4d7f-849e-8baaf4839630" providerId="ADAL" clId="{72AF2A81-B5F1-4E69-8DE0-BB2C03A25C53}" dt="2025-07-29T10:10:40.884" v="1077" actId="20577"/>
+          <ac:spMkLst>
+            <pc:docMk/>
+            <pc:sldMk cId="2289031963" sldId="261"/>
+            <ac:spMk id="2" creationId="{00EEBDCC-EB26-4FB3-B42B-66516F6C2BFA}"/>
+          </ac:spMkLst>
+        </pc:spChg>
+      </pc:sldChg>
+      <pc:sldChg chg="addSp delSp modSp new del mod delAnim modAnim">
+        <pc:chgData name="Darbandi, Hamed (UT-EEMCS)" userId="14c3e4a7-a657-4d7f-849e-8baaf4839630" providerId="ADAL" clId="{72AF2A81-B5F1-4E69-8DE0-BB2C03A25C53}" dt="2025-07-29T13:15:21.135" v="1130" actId="2696"/>
+        <pc:sldMkLst>
+          <pc:docMk/>
+          <pc:sldMk cId="658376717" sldId="262"/>
+        </pc:sldMkLst>
+        <pc:spChg chg="del">
+          <ac:chgData name="Darbandi, Hamed (UT-EEMCS)" userId="14c3e4a7-a657-4d7f-849e-8baaf4839630" providerId="ADAL" clId="{72AF2A81-B5F1-4E69-8DE0-BB2C03A25C53}" dt="2025-07-29T13:10:10.532" v="1089" actId="478"/>
+          <ac:spMkLst>
+            <pc:docMk/>
+            <pc:sldMk cId="658376717" sldId="262"/>
+            <ac:spMk id="2" creationId="{1F7E5F36-0F1B-3180-0CC4-686071EB1E2F}"/>
+          </ac:spMkLst>
+        </pc:spChg>
+        <pc:spChg chg="del">
+          <ac:chgData name="Darbandi, Hamed (UT-EEMCS)" userId="14c3e4a7-a657-4d7f-849e-8baaf4839630" providerId="ADAL" clId="{72AF2A81-B5F1-4E69-8DE0-BB2C03A25C53}" dt="2025-07-29T13:09:28.458" v="1079" actId="931"/>
+          <ac:spMkLst>
+            <pc:docMk/>
+            <pc:sldMk cId="658376717" sldId="262"/>
+            <ac:spMk id="3" creationId="{0E1754E2-B7AA-D78A-1084-47030699D5BD}"/>
+          </ac:spMkLst>
+        </pc:spChg>
+        <pc:spChg chg="add del mod">
+          <ac:chgData name="Darbandi, Hamed (UT-EEMCS)" userId="14c3e4a7-a657-4d7f-849e-8baaf4839630" providerId="ADAL" clId="{72AF2A81-B5F1-4E69-8DE0-BB2C03A25C53}" dt="2025-07-29T13:10:12.386" v="1090" actId="478"/>
+          <ac:spMkLst>
+            <pc:docMk/>
+            <pc:sldMk cId="658376717" sldId="262"/>
+            <ac:spMk id="9" creationId="{8B07D625-7B5B-1FB7-A467-1285FA7299C9}"/>
+          </ac:spMkLst>
+        </pc:spChg>
+        <pc:picChg chg="add del mod">
+          <ac:chgData name="Darbandi, Hamed (UT-EEMCS)" userId="14c3e4a7-a657-4d7f-849e-8baaf4839630" providerId="ADAL" clId="{72AF2A81-B5F1-4E69-8DE0-BB2C03A25C53}" dt="2025-07-29T13:10:07.944" v="1088" actId="478"/>
+          <ac:picMkLst>
+            <pc:docMk/>
+            <pc:sldMk cId="658376717" sldId="262"/>
+            <ac:picMk id="5" creationId="{BC3A4FAE-A4C4-E9EC-82B9-FC4FCE97F96C}"/>
+          </ac:picMkLst>
+        </pc:picChg>
+        <pc:picChg chg="add mod">
+          <ac:chgData name="Darbandi, Hamed (UT-EEMCS)" userId="14c3e4a7-a657-4d7f-849e-8baaf4839630" providerId="ADAL" clId="{72AF2A81-B5F1-4E69-8DE0-BB2C03A25C53}" dt="2025-07-29T13:10:06.508" v="1087" actId="931"/>
+          <ac:picMkLst>
+            <pc:docMk/>
+            <pc:sldMk cId="658376717" sldId="262"/>
+            <ac:picMk id="7" creationId="{4B11D103-227B-361D-5EEF-2A308C6E34E1}"/>
+          </ac:picMkLst>
+        </pc:picChg>
+        <pc:picChg chg="add del mod">
+          <ac:chgData name="Darbandi, Hamed (UT-EEMCS)" userId="14c3e4a7-a657-4d7f-849e-8baaf4839630" providerId="ADAL" clId="{72AF2A81-B5F1-4E69-8DE0-BB2C03A25C53}" dt="2025-07-29T13:13:19.525" v="1124" actId="478"/>
+          <ac:picMkLst>
+            <pc:docMk/>
+            <pc:sldMk cId="658376717" sldId="262"/>
+            <ac:picMk id="11" creationId="{48936987-01A3-F1C2-B6BE-55FA7D8FA408}"/>
+          </ac:picMkLst>
+        </pc:picChg>
+        <pc:picChg chg="add del mod">
+          <ac:chgData name="Darbandi, Hamed (UT-EEMCS)" userId="14c3e4a7-a657-4d7f-849e-8baaf4839630" providerId="ADAL" clId="{72AF2A81-B5F1-4E69-8DE0-BB2C03A25C53}" dt="2025-07-29T13:13:12.920" v="1123" actId="478"/>
+          <ac:picMkLst>
+            <pc:docMk/>
+            <pc:sldMk cId="658376717" sldId="262"/>
+            <ac:picMk id="13" creationId="{37A4E26B-9C86-7C32-8571-208F3F6AFD9F}"/>
+          </ac:picMkLst>
+        </pc:picChg>
+        <pc:picChg chg="add del mod">
+          <ac:chgData name="Darbandi, Hamed (UT-EEMCS)" userId="14c3e4a7-a657-4d7f-849e-8baaf4839630" providerId="ADAL" clId="{72AF2A81-B5F1-4E69-8DE0-BB2C03A25C53}" dt="2025-07-29T13:13:11.686" v="1122" actId="478"/>
+          <ac:picMkLst>
+            <pc:docMk/>
+            <pc:sldMk cId="658376717" sldId="262"/>
+            <ac:picMk id="15" creationId="{1EB1135D-39A9-4E98-1D48-F3E988CDD908}"/>
+          </ac:picMkLst>
+        </pc:picChg>
+        <pc:picChg chg="add del mod">
+          <ac:chgData name="Darbandi, Hamed (UT-EEMCS)" userId="14c3e4a7-a657-4d7f-849e-8baaf4839630" providerId="ADAL" clId="{72AF2A81-B5F1-4E69-8DE0-BB2C03A25C53}" dt="2025-07-29T13:13:10.167" v="1120" actId="478"/>
+          <ac:picMkLst>
+            <pc:docMk/>
+            <pc:sldMk cId="658376717" sldId="262"/>
+            <ac:picMk id="17" creationId="{4DDD9DD2-F37E-BBDB-D819-13E0D890A10D}"/>
+          </ac:picMkLst>
+        </pc:picChg>
+        <pc:picChg chg="add del mod ord">
+          <ac:chgData name="Darbandi, Hamed (UT-EEMCS)" userId="14c3e4a7-a657-4d7f-849e-8baaf4839630" providerId="ADAL" clId="{72AF2A81-B5F1-4E69-8DE0-BB2C03A25C53}" dt="2025-07-29T13:13:11.046" v="1121" actId="478"/>
+          <ac:picMkLst>
+            <pc:docMk/>
+            <pc:sldMk cId="658376717" sldId="262"/>
+            <ac:picMk id="19" creationId="{BE25FDF5-4CD4-C9D8-2AD3-FB438DAC13D4}"/>
+          </ac:picMkLst>
+        </pc:picChg>
+        <pc:picChg chg="add del mod ord">
+          <ac:chgData name="Darbandi, Hamed (UT-EEMCS)" userId="14c3e4a7-a657-4d7f-849e-8baaf4839630" providerId="ADAL" clId="{72AF2A81-B5F1-4E69-8DE0-BB2C03A25C53}" dt="2025-07-29T13:13:20.276" v="1125" actId="478"/>
+          <ac:picMkLst>
+            <pc:docMk/>
+            <pc:sldMk cId="658376717" sldId="262"/>
+            <ac:picMk id="21" creationId="{0838CD85-B09F-EFB3-7C65-D57F684C746C}"/>
+          </ac:picMkLst>
+        </pc:picChg>
+        <pc:picChg chg="add mod">
+          <ac:chgData name="Darbandi, Hamed (UT-EEMCS)" userId="14c3e4a7-a657-4d7f-849e-8baaf4839630" providerId="ADAL" clId="{72AF2A81-B5F1-4E69-8DE0-BB2C03A25C53}" dt="2025-07-29T13:13:42.651" v="1129"/>
+          <ac:picMkLst>
+            <pc:docMk/>
+            <pc:sldMk cId="658376717" sldId="262"/>
+            <ac:picMk id="23" creationId="{6963BDA8-DE3B-0588-F56B-E919E0BC3D76}"/>
+          </ac:picMkLst>
+        </pc:picChg>
+      </pc:sldChg>
+      <pc:sldChg chg="addSp delSp modSp new mod">
+        <pc:chgData name="Darbandi, Hamed (UT-EEMCS)" userId="14c3e4a7-a657-4d7f-849e-8baaf4839630" providerId="ADAL" clId="{72AF2A81-B5F1-4E69-8DE0-BB2C03A25C53}" dt="2025-07-29T13:59:48.554" v="1143" actId="20577"/>
+        <pc:sldMkLst>
+          <pc:docMk/>
+          <pc:sldMk cId="1117176596" sldId="262"/>
+        </pc:sldMkLst>
+        <pc:spChg chg="mod">
+          <ac:chgData name="Darbandi, Hamed (UT-EEMCS)" userId="14c3e4a7-a657-4d7f-849e-8baaf4839630" providerId="ADAL" clId="{72AF2A81-B5F1-4E69-8DE0-BB2C03A25C53}" dt="2025-07-29T13:59:48.554" v="1143" actId="20577"/>
+          <ac:spMkLst>
+            <pc:docMk/>
+            <pc:sldMk cId="1117176596" sldId="262"/>
+            <ac:spMk id="2" creationId="{96887403-1A6D-48AA-DFAB-1649BBA144C7}"/>
+          </ac:spMkLst>
+        </pc:spChg>
+        <pc:spChg chg="del">
+          <ac:chgData name="Darbandi, Hamed (UT-EEMCS)" userId="14c3e4a7-a657-4d7f-849e-8baaf4839630" providerId="ADAL" clId="{72AF2A81-B5F1-4E69-8DE0-BB2C03A25C53}" dt="2025-07-29T13:59:37.849" v="1132"/>
+          <ac:spMkLst>
+            <pc:docMk/>
+            <pc:sldMk cId="1117176596" sldId="262"/>
+            <ac:spMk id="3" creationId="{748D379C-4C2C-CAF9-0016-A2FAE066E4F3}"/>
+          </ac:spMkLst>
+        </pc:spChg>
+        <pc:picChg chg="add mod">
+          <ac:chgData name="Darbandi, Hamed (UT-EEMCS)" userId="14c3e4a7-a657-4d7f-849e-8baaf4839630" providerId="ADAL" clId="{72AF2A81-B5F1-4E69-8DE0-BB2C03A25C53}" dt="2025-07-29T13:59:40.239" v="1133" actId="27614"/>
+          <ac:picMkLst>
+            <pc:docMk/>
+            <pc:sldMk cId="1117176596" sldId="262"/>
+            <ac:picMk id="5" creationId="{03D39276-A5BD-C050-807D-E446FCB4D0EC}"/>
+          </ac:picMkLst>
+        </pc:picChg>
+      </pc:sldChg>
+      <pc:sldMasterChg chg="add addSldLayout">
+        <pc:chgData name="Darbandi, Hamed (UT-EEMCS)" userId="14c3e4a7-a657-4d7f-849e-8baaf4839630" providerId="ADAL" clId="{72AF2A81-B5F1-4E69-8DE0-BB2C03A25C53}" dt="2025-07-29T10:09:25.540" v="1021" actId="27028"/>
+        <pc:sldMasterMkLst>
+          <pc:docMk/>
+          <pc:sldMasterMk cId="1954053638" sldId="2147483924"/>
+        </pc:sldMasterMkLst>
+        <pc:sldLayoutChg chg="add">
+          <pc:chgData name="Darbandi, Hamed (UT-EEMCS)" userId="14c3e4a7-a657-4d7f-849e-8baaf4839630" providerId="ADAL" clId="{72AF2A81-B5F1-4E69-8DE0-BB2C03A25C53}" dt="2025-07-29T10:09:25.540" v="1021" actId="27028"/>
+          <pc:sldLayoutMkLst>
+            <pc:docMk/>
+            <pc:sldMasterMk cId="1954053638" sldId="2147483924"/>
+            <pc:sldLayoutMk cId="2358387226" sldId="2147484034"/>
+          </pc:sldLayoutMkLst>
+        </pc:sldLayoutChg>
+      </pc:sldMasterChg>
     </pc:docChg>
   </pc:docChgLst>
 </pc:chgInfo>
@@ -7881,7 +8053,7 @@
           <a:p>
             <a:fld id="{DC11B0E6-9697-40A3-AD93-37D4A7A41591}" type="datetimeFigureOut">
               <a:rPr lang="en-US" smtClean="0"/>
-              <a:t>7/28/2025</a:t>
+              <a:t>7/29/2025</a:t>
             </a:fld>
             <a:endParaRPr lang="en-US"/>
           </a:p>
@@ -8079,7 +8251,7 @@
           <a:p>
             <a:fld id="{DC11B0E6-9697-40A3-AD93-37D4A7A41591}" type="datetimeFigureOut">
               <a:rPr lang="en-US" smtClean="0"/>
-              <a:t>7/28/2025</a:t>
+              <a:t>7/29/2025</a:t>
             </a:fld>
             <a:endParaRPr lang="en-US"/>
           </a:p>
@@ -8287,7 +8459,7 @@
           <a:p>
             <a:fld id="{DC11B0E6-9697-40A3-AD93-37D4A7A41591}" type="datetimeFigureOut">
               <a:rPr lang="en-US" smtClean="0"/>
-              <a:t>7/28/2025</a:t>
+              <a:t>7/29/2025</a:t>
             </a:fld>
             <a:endParaRPr lang="en-US"/>
           </a:p>
@@ -8351,6 +8523,228 @@
     <p:extLst>
       <p:ext uri="{BB962C8B-B14F-4D97-AF65-F5344CB8AC3E}">
         <p14:creationId xmlns:p14="http://schemas.microsoft.com/office/powerpoint/2010/main" val="1797676722"/>
+      </p:ext>
+    </p:extLst>
+  </p:cSld>
+  <p:clrMapOvr>
+    <a:masterClrMapping/>
+  </p:clrMapOvr>
+</p:sldLayout>
+</file>
+
+<file path=ppt/slideLayouts/slideLayout12.xml><?xml version="1.0" encoding="utf-8"?>
+<p:sldLayout xmlns:a="http://schemas.openxmlformats.org/drawingml/2006/main" xmlns:r="http://schemas.openxmlformats.org/officeDocument/2006/relationships" xmlns:p="http://schemas.openxmlformats.org/presentationml/2006/main" type="title">
+  <p:cSld name="Title Slide">
+    <p:spTree>
+      <p:nvGrpSpPr>
+        <p:cNvPr id="1" name=""/>
+        <p:cNvGrpSpPr/>
+        <p:nvPr/>
+      </p:nvGrpSpPr>
+      <p:grpSpPr>
+        <a:xfrm>
+          <a:off x="0" y="0"/>
+          <a:ext cx="0" cy="0"/>
+          <a:chOff x="0" y="0"/>
+          <a:chExt cx="0" cy="0"/>
+        </a:xfrm>
+      </p:grpSpPr>
+      <p:sp>
+        <p:nvSpPr>
+          <p:cNvPr id="2" name="Title 1">
+            <a:extLst>
+              <a:ext uri="{FF2B5EF4-FFF2-40B4-BE49-F238E27FC236}">
+                <a16:creationId xmlns:a16="http://schemas.microsoft.com/office/drawing/2014/main" id="{7B22BE74-8AC6-42B4-A0FE-9B68C6E18622}"/>
+              </a:ext>
+            </a:extLst>
+          </p:cNvPr>
+          <p:cNvSpPr>
+            <a:spLocks noGrp="1"/>
+          </p:cNvSpPr>
+          <p:nvPr>
+            <p:ph type="ctrTitle"/>
+          </p:nvPr>
+        </p:nvSpPr>
+        <p:spPr>
+          <a:xfrm>
+            <a:off x="1524000" y="1122363"/>
+            <a:ext cx="9144000" cy="2387600"/>
+          </a:xfrm>
+        </p:spPr>
+        <p:txBody>
+          <a:bodyPr anchor="b"/>
+          <a:lstStyle>
+            <a:lvl1pPr algn="ctr">
+              <a:defRPr sz="6000"/>
+            </a:lvl1pPr>
+          </a:lstStyle>
+          <a:p>
+            <a:r>
+              <a:rPr lang="en-US"/>
+              <a:t>Click to edit Master title style</a:t>
+            </a:r>
+            <a:endParaRPr lang="nl-NL"/>
+          </a:p>
+        </p:txBody>
+      </p:sp>
+      <p:sp>
+        <p:nvSpPr>
+          <p:cNvPr id="3" name="Subtitle 2">
+            <a:extLst>
+              <a:ext uri="{FF2B5EF4-FFF2-40B4-BE49-F238E27FC236}">
+                <a16:creationId xmlns:a16="http://schemas.microsoft.com/office/drawing/2014/main" id="{DF949681-D981-4037-90F3-F120BCBCFEEA}"/>
+              </a:ext>
+            </a:extLst>
+          </p:cNvPr>
+          <p:cNvSpPr>
+            <a:spLocks noGrp="1"/>
+          </p:cNvSpPr>
+          <p:nvPr>
+            <p:ph type="subTitle" idx="1"/>
+          </p:nvPr>
+        </p:nvSpPr>
+        <p:spPr>
+          <a:xfrm>
+            <a:off x="1524000" y="3602038"/>
+            <a:ext cx="9144000" cy="1655762"/>
+          </a:xfrm>
+        </p:spPr>
+        <p:txBody>
+          <a:bodyPr/>
+          <a:lstStyle>
+            <a:lvl1pPr marL="0" indent="0" algn="ctr">
+              <a:buNone/>
+              <a:defRPr sz="2400"/>
+            </a:lvl1pPr>
+            <a:lvl2pPr marL="457200" indent="0" algn="ctr">
+              <a:buNone/>
+              <a:defRPr sz="2000"/>
+            </a:lvl2pPr>
+            <a:lvl3pPr marL="914400" indent="0" algn="ctr">
+              <a:buNone/>
+              <a:defRPr sz="1800"/>
+            </a:lvl3pPr>
+            <a:lvl4pPr marL="1371600" indent="0" algn="ctr">
+              <a:buNone/>
+              <a:defRPr sz="1600"/>
+            </a:lvl4pPr>
+            <a:lvl5pPr marL="1828800" indent="0" algn="ctr">
+              <a:buNone/>
+              <a:defRPr sz="1600"/>
+            </a:lvl5pPr>
+            <a:lvl6pPr marL="2286000" indent="0" algn="ctr">
+              <a:buNone/>
+              <a:defRPr sz="1600"/>
+            </a:lvl6pPr>
+            <a:lvl7pPr marL="2743200" indent="0" algn="ctr">
+              <a:buNone/>
+              <a:defRPr sz="1600"/>
+            </a:lvl7pPr>
+            <a:lvl8pPr marL="3200400" indent="0" algn="ctr">
+              <a:buNone/>
+              <a:defRPr sz="1600"/>
+            </a:lvl8pPr>
+            <a:lvl9pPr marL="3657600" indent="0" algn="ctr">
+              <a:buNone/>
+              <a:defRPr sz="1600"/>
+            </a:lvl9pPr>
+          </a:lstStyle>
+          <a:p>
+            <a:r>
+              <a:rPr lang="en-US"/>
+              <a:t>Click to edit Master subtitle style</a:t>
+            </a:r>
+            <a:endParaRPr lang="nl-NL"/>
+          </a:p>
+        </p:txBody>
+      </p:sp>
+      <p:sp>
+        <p:nvSpPr>
+          <p:cNvPr id="4" name="Date Placeholder 3">
+            <a:extLst>
+              <a:ext uri="{FF2B5EF4-FFF2-40B4-BE49-F238E27FC236}">
+                <a16:creationId xmlns:a16="http://schemas.microsoft.com/office/drawing/2014/main" id="{D1B952D0-E462-4CD7-AB8C-FB4AE37E153C}"/>
+              </a:ext>
+            </a:extLst>
+          </p:cNvPr>
+          <p:cNvSpPr>
+            <a:spLocks noGrp="1"/>
+          </p:cNvSpPr>
+          <p:nvPr>
+            <p:ph type="dt" sz="half" idx="10"/>
+          </p:nvPr>
+        </p:nvSpPr>
+        <p:spPr/>
+        <p:txBody>
+          <a:bodyPr/>
+          <a:lstStyle/>
+          <a:p>
+            <a:fld id="{4830D67E-D22D-4A4C-9B3A-26181A3C2579}" type="datetimeFigureOut">
+              <a:rPr lang="nl-NL" smtClean="0"/>
+              <a:t>29-7-2025</a:t>
+            </a:fld>
+            <a:endParaRPr lang="nl-NL"/>
+          </a:p>
+        </p:txBody>
+      </p:sp>
+      <p:sp>
+        <p:nvSpPr>
+          <p:cNvPr id="5" name="Footer Placeholder 4">
+            <a:extLst>
+              <a:ext uri="{FF2B5EF4-FFF2-40B4-BE49-F238E27FC236}">
+                <a16:creationId xmlns:a16="http://schemas.microsoft.com/office/drawing/2014/main" id="{BB2074BB-A6D6-4CB3-9608-DC7410191CC8}"/>
+              </a:ext>
+            </a:extLst>
+          </p:cNvPr>
+          <p:cNvSpPr>
+            <a:spLocks noGrp="1"/>
+          </p:cNvSpPr>
+          <p:nvPr>
+            <p:ph type="ftr" sz="quarter" idx="11"/>
+          </p:nvPr>
+        </p:nvSpPr>
+        <p:spPr/>
+        <p:txBody>
+          <a:bodyPr/>
+          <a:lstStyle/>
+          <a:p>
+            <a:endParaRPr lang="nl-NL"/>
+          </a:p>
+        </p:txBody>
+      </p:sp>
+      <p:sp>
+        <p:nvSpPr>
+          <p:cNvPr id="6" name="Slide Number Placeholder 5">
+            <a:extLst>
+              <a:ext uri="{FF2B5EF4-FFF2-40B4-BE49-F238E27FC236}">
+                <a16:creationId xmlns:a16="http://schemas.microsoft.com/office/drawing/2014/main" id="{E3F05171-B0C5-4520-85C0-79FE870653C5}"/>
+              </a:ext>
+            </a:extLst>
+          </p:cNvPr>
+          <p:cNvSpPr>
+            <a:spLocks noGrp="1"/>
+          </p:cNvSpPr>
+          <p:nvPr>
+            <p:ph type="sldNum" sz="quarter" idx="12"/>
+          </p:nvPr>
+        </p:nvSpPr>
+        <p:spPr/>
+        <p:txBody>
+          <a:bodyPr/>
+          <a:lstStyle/>
+          <a:p>
+            <a:fld id="{C698B215-220E-4625-ADD6-78E8B3068885}" type="slidenum">
+              <a:rPr lang="nl-NL" smtClean="0"/>
+              <a:t>‹#›</a:t>
+            </a:fld>
+            <a:endParaRPr lang="nl-NL"/>
+          </a:p>
+        </p:txBody>
+      </p:sp>
+    </p:spTree>
+    <p:extLst>
+      <p:ext uri="{BB962C8B-B14F-4D97-AF65-F5344CB8AC3E}">
+        <p14:creationId xmlns:p14="http://schemas.microsoft.com/office/powerpoint/2010/main" val="2358387226"/>
       </p:ext>
     </p:extLst>
   </p:cSld>
@@ -8485,7 +8879,7 @@
           <a:p>
             <a:fld id="{DC11B0E6-9697-40A3-AD93-37D4A7A41591}" type="datetimeFigureOut">
               <a:rPr lang="en-US" smtClean="0"/>
-              <a:t>7/28/2025</a:t>
+              <a:t>7/29/2025</a:t>
             </a:fld>
             <a:endParaRPr lang="en-US"/>
           </a:p>
@@ -8760,7 +9154,7 @@
           <a:p>
             <a:fld id="{DC11B0E6-9697-40A3-AD93-37D4A7A41591}" type="datetimeFigureOut">
               <a:rPr lang="en-US" smtClean="0"/>
-              <a:t>7/28/2025</a:t>
+              <a:t>7/29/2025</a:t>
             </a:fld>
             <a:endParaRPr lang="en-US"/>
           </a:p>
@@ -9025,7 +9419,7 @@
           <a:p>
             <a:fld id="{DC11B0E6-9697-40A3-AD93-37D4A7A41591}" type="datetimeFigureOut">
               <a:rPr lang="en-US" smtClean="0"/>
-              <a:t>7/28/2025</a:t>
+              <a:t>7/29/2025</a:t>
             </a:fld>
             <a:endParaRPr lang="en-US"/>
           </a:p>
@@ -9437,7 +9831,7 @@
           <a:p>
             <a:fld id="{DC11B0E6-9697-40A3-AD93-37D4A7A41591}" type="datetimeFigureOut">
               <a:rPr lang="en-US" smtClean="0"/>
-              <a:t>7/28/2025</a:t>
+              <a:t>7/29/2025</a:t>
             </a:fld>
             <a:endParaRPr lang="en-US"/>
           </a:p>
@@ -9578,7 +9972,7 @@
           <a:p>
             <a:fld id="{DC11B0E6-9697-40A3-AD93-37D4A7A41591}" type="datetimeFigureOut">
               <a:rPr lang="en-US" smtClean="0"/>
-              <a:t>7/28/2025</a:t>
+              <a:t>7/29/2025</a:t>
             </a:fld>
             <a:endParaRPr lang="en-US"/>
           </a:p>
@@ -9691,7 +10085,7 @@
           <a:p>
             <a:fld id="{DC11B0E6-9697-40A3-AD93-37D4A7A41591}" type="datetimeFigureOut">
               <a:rPr lang="en-US" smtClean="0"/>
-              <a:t>7/28/2025</a:t>
+              <a:t>7/29/2025</a:t>
             </a:fld>
             <a:endParaRPr lang="en-US"/>
           </a:p>
@@ -10002,7 +10396,7 @@
           <a:p>
             <a:fld id="{DC11B0E6-9697-40A3-AD93-37D4A7A41591}" type="datetimeFigureOut">
               <a:rPr lang="en-US" smtClean="0"/>
-              <a:t>7/28/2025</a:t>
+              <a:t>7/29/2025</a:t>
             </a:fld>
             <a:endParaRPr lang="en-US"/>
           </a:p>
@@ -10290,7 +10684,7 @@
           <a:p>
             <a:fld id="{DC11B0E6-9697-40A3-AD93-37D4A7A41591}" type="datetimeFigureOut">
               <a:rPr lang="en-US" smtClean="0"/>
-              <a:t>7/28/2025</a:t>
+              <a:t>7/29/2025</a:t>
             </a:fld>
             <a:endParaRPr lang="en-US"/>
           </a:p>
@@ -10531,7 +10925,7 @@
           <a:p>
             <a:fld id="{DC11B0E6-9697-40A3-AD93-37D4A7A41591}" type="datetimeFigureOut">
               <a:rPr lang="en-US" smtClean="0"/>
-              <a:t>7/28/2025</a:t>
+              <a:t>7/29/2025</a:t>
             </a:fld>
             <a:endParaRPr lang="en-US"/>
           </a:p>
@@ -10931,7 +11325,842 @@
 </p:sldMaster>
 </file>
 
+<file path=ppt/slideMasters/slideMaster2.xml><?xml version="1.0" encoding="utf-8"?>
+<p:sldMaster xmlns:a="http://schemas.openxmlformats.org/drawingml/2006/main" xmlns:r="http://schemas.openxmlformats.org/officeDocument/2006/relationships" xmlns:p="http://schemas.openxmlformats.org/presentationml/2006/main">
+  <p:cSld>
+    <p:bg>
+      <p:bgRef idx="1001">
+        <a:schemeClr val="bg1"/>
+      </p:bgRef>
+    </p:bg>
+    <p:spTree>
+      <p:nvGrpSpPr>
+        <p:cNvPr id="1" name=""/>
+        <p:cNvGrpSpPr/>
+        <p:nvPr/>
+      </p:nvGrpSpPr>
+      <p:grpSpPr>
+        <a:xfrm>
+          <a:off x="0" y="0"/>
+          <a:ext cx="0" cy="0"/>
+          <a:chOff x="0" y="0"/>
+          <a:chExt cx="0" cy="0"/>
+        </a:xfrm>
+      </p:grpSpPr>
+      <p:sp>
+        <p:nvSpPr>
+          <p:cNvPr id="4" name="Date Placeholder 3"/>
+          <p:cNvSpPr>
+            <a:spLocks noGrp="1"/>
+          </p:cNvSpPr>
+          <p:nvPr>
+            <p:ph type="dt" sz="half" idx="2"/>
+          </p:nvPr>
+        </p:nvSpPr>
+        <p:spPr>
+          <a:xfrm>
+            <a:off x="218661" y="6356350"/>
+            <a:ext cx="2365513" cy="365125"/>
+          </a:xfrm>
+          <a:prstGeom prst="rect">
+            <a:avLst/>
+          </a:prstGeom>
+        </p:spPr>
+        <p:txBody>
+          <a:bodyPr vert="horz" lIns="91440" tIns="45720" rIns="91440" bIns="45720" rtlCol="0" anchor="ctr"/>
+          <a:lstStyle>
+            <a:lvl1pPr algn="l">
+              <a:defRPr sz="1200" cap="all" baseline="0">
+                <a:solidFill>
+                  <a:schemeClr val="tx1">
+                    <a:tint val="75000"/>
+                  </a:schemeClr>
+                </a:solidFill>
+                <a:latin typeface="Arial" panose="020B0604020202020204" pitchFamily="34" charset="0"/>
+              </a:defRPr>
+            </a:lvl1pPr>
+          </a:lstStyle>
+          <a:p>
+            <a:fld id="{8E469526-6E45-7F42-9A5B-A968FB10F2EF}" type="datetime3">
+              <a:rPr lang="en-US" smtClean="0"/>
+              <a:t>29 July 2025</a:t>
+            </a:fld>
+            <a:endParaRPr lang="en-US" dirty="0"/>
+          </a:p>
+        </p:txBody>
+      </p:sp>
+      <p:sp>
+        <p:nvSpPr>
+          <p:cNvPr id="5" name="Footer Placeholder 4"/>
+          <p:cNvSpPr>
+            <a:spLocks noGrp="1"/>
+          </p:cNvSpPr>
+          <p:nvPr>
+            <p:ph type="ftr" sz="quarter" idx="3"/>
+          </p:nvPr>
+        </p:nvSpPr>
+        <p:spPr>
+          <a:xfrm>
+            <a:off x="4015409" y="6356350"/>
+            <a:ext cx="6370982" cy="365125"/>
+          </a:xfrm>
+          <a:prstGeom prst="rect">
+            <a:avLst/>
+          </a:prstGeom>
+        </p:spPr>
+        <p:txBody>
+          <a:bodyPr vert="horz" lIns="91440" tIns="45720" rIns="91440" bIns="45720" rtlCol="0" anchor="ctr"/>
+          <a:lstStyle>
+            <a:lvl1pPr algn="l">
+              <a:defRPr sz="1200" cap="all" baseline="0">
+                <a:solidFill>
+                  <a:schemeClr val="tx1">
+                    <a:tint val="75000"/>
+                  </a:schemeClr>
+                </a:solidFill>
+                <a:latin typeface="Arial" panose="020B0604020202020204" pitchFamily="34" charset="0"/>
+              </a:defRPr>
+            </a:lvl1pPr>
+          </a:lstStyle>
+          <a:p>
+            <a:endParaRPr lang="en-US" dirty="0"/>
+          </a:p>
+        </p:txBody>
+      </p:sp>
+      <p:sp>
+        <p:nvSpPr>
+          <p:cNvPr id="6" name="Slide Number Placeholder 5"/>
+          <p:cNvSpPr>
+            <a:spLocks noGrp="1"/>
+          </p:cNvSpPr>
+          <p:nvPr>
+            <p:ph type="sldNum" sz="quarter" idx="4"/>
+          </p:nvPr>
+        </p:nvSpPr>
+        <p:spPr>
+          <a:xfrm>
+            <a:off x="11082130" y="6356350"/>
+            <a:ext cx="844826" cy="365125"/>
+          </a:xfrm>
+          <a:prstGeom prst="rect">
+            <a:avLst/>
+          </a:prstGeom>
+        </p:spPr>
+        <p:txBody>
+          <a:bodyPr vert="horz" lIns="91440" tIns="45720" rIns="91440" bIns="45720" rtlCol="0" anchor="ctr"/>
+          <a:lstStyle>
+            <a:lvl1pPr algn="r">
+              <a:defRPr sz="1200">
+                <a:solidFill>
+                  <a:schemeClr val="tx1">
+                    <a:tint val="75000"/>
+                  </a:schemeClr>
+                </a:solidFill>
+              </a:defRPr>
+            </a:lvl1pPr>
+          </a:lstStyle>
+          <a:p>
+            <a:fld id="{59D79D20-9926-6947-91A9-E826DAB4C488}" type="slidenum">
+              <a:rPr lang="en-US" smtClean="0"/>
+              <a:t>‹#›</a:t>
+            </a:fld>
+            <a:endParaRPr lang="en-US"/>
+          </a:p>
+        </p:txBody>
+      </p:sp>
+      <p:pic>
+        <p:nvPicPr>
+          <p:cNvPr id="8" name="Picture 7">
+            <a:extLst>
+              <a:ext uri="{FF2B5EF4-FFF2-40B4-BE49-F238E27FC236}">
+                <a16:creationId xmlns:a16="http://schemas.microsoft.com/office/drawing/2014/main" id="{C2310C1B-65DB-2343-8AA3-FE42BB8807D3}"/>
+              </a:ext>
+            </a:extLst>
+          </p:cNvPr>
+          <p:cNvPicPr>
+            <a:picLocks noChangeAspect="1"/>
+          </p:cNvPicPr>
+          <p:nvPr userDrawn="1"/>
+        </p:nvPicPr>
+        <p:blipFill>
+          <a:blip r:embed="rId3"/>
+          <a:stretch>
+            <a:fillRect/>
+          </a:stretch>
+        </p:blipFill>
+        <p:spPr>
+          <a:xfrm>
+            <a:off x="3332205" y="1500167"/>
+            <a:ext cx="5527589" cy="2757394"/>
+          </a:xfrm>
+          <a:prstGeom prst="rect">
+            <a:avLst/>
+          </a:prstGeom>
+        </p:spPr>
+      </p:pic>
+    </p:spTree>
+    <p:extLst>
+      <p:ext uri="{BB962C8B-B14F-4D97-AF65-F5344CB8AC3E}">
+        <p14:creationId xmlns:p14="http://schemas.microsoft.com/office/powerpoint/2010/main" val="1954053638"/>
+      </p:ext>
+    </p:extLst>
+  </p:cSld>
+  <p:clrMap bg1="lt1" tx1="dk1" bg2="lt2" tx2="dk2" accent1="accent1" accent2="accent2" accent3="accent3" accent4="accent4" accent5="accent5" accent6="accent6" hlink="hlink" folHlink="folHlink"/>
+  <p:sldLayoutIdLst>
+    <p:sldLayoutId id="2147484034" r:id="rId1"/>
+  </p:sldLayoutIdLst>
+  <p:hf hdr="0"/>
+  <p:txStyles>
+    <p:titleStyle>
+      <a:lvl1pPr algn="l" defTabSz="914400" rtl="0" eaLnBrk="1" latinLnBrk="0" hangingPunct="1">
+        <a:lnSpc>
+          <a:spcPct val="90000"/>
+        </a:lnSpc>
+        <a:spcBef>
+          <a:spcPct val="0"/>
+        </a:spcBef>
+        <a:buNone/>
+        <a:defRPr sz="3600" b="1" i="0" kern="1200" cap="all" baseline="0">
+          <a:solidFill>
+            <a:schemeClr val="tx1"/>
+          </a:solidFill>
+          <a:latin typeface="Arial Narrow" panose="020B0606020202030204" pitchFamily="34" charset="0"/>
+          <a:ea typeface="+mj-ea"/>
+          <a:cs typeface="+mj-cs"/>
+        </a:defRPr>
+      </a:lvl1pPr>
+    </p:titleStyle>
+    <p:bodyStyle>
+      <a:lvl1pPr marL="228600" indent="-228600" algn="l" defTabSz="914400" rtl="0" eaLnBrk="1" latinLnBrk="0" hangingPunct="1">
+        <a:lnSpc>
+          <a:spcPct val="90000"/>
+        </a:lnSpc>
+        <a:spcBef>
+          <a:spcPts val="1000"/>
+        </a:spcBef>
+        <a:buFont typeface="Arial" panose="020B0604020202020204" pitchFamily="34" charset="0"/>
+        <a:buChar char="•"/>
+        <a:defRPr sz="2800" kern="1200">
+          <a:solidFill>
+            <a:schemeClr val="tx1"/>
+          </a:solidFill>
+          <a:latin typeface="+mn-lt"/>
+          <a:ea typeface="+mn-ea"/>
+          <a:cs typeface="+mn-cs"/>
+        </a:defRPr>
+      </a:lvl1pPr>
+      <a:lvl2pPr marL="685800" indent="-228600" algn="l" defTabSz="914400" rtl="0" eaLnBrk="1" latinLnBrk="0" hangingPunct="1">
+        <a:lnSpc>
+          <a:spcPct val="90000"/>
+        </a:lnSpc>
+        <a:spcBef>
+          <a:spcPts val="500"/>
+        </a:spcBef>
+        <a:buFont typeface="Arial" panose="020B0604020202020204" pitchFamily="34" charset="0"/>
+        <a:buChar char="•"/>
+        <a:defRPr sz="2400" kern="1200">
+          <a:solidFill>
+            <a:schemeClr val="tx1"/>
+          </a:solidFill>
+          <a:latin typeface="+mn-lt"/>
+          <a:ea typeface="+mn-ea"/>
+          <a:cs typeface="+mn-cs"/>
+        </a:defRPr>
+      </a:lvl2pPr>
+      <a:lvl3pPr marL="1143000" indent="-228600" algn="l" defTabSz="914400" rtl="0" eaLnBrk="1" latinLnBrk="0" hangingPunct="1">
+        <a:lnSpc>
+          <a:spcPct val="90000"/>
+        </a:lnSpc>
+        <a:spcBef>
+          <a:spcPts val="500"/>
+        </a:spcBef>
+        <a:buFont typeface="Arial" panose="020B0604020202020204" pitchFamily="34" charset="0"/>
+        <a:buChar char="•"/>
+        <a:defRPr sz="2000" kern="1200">
+          <a:solidFill>
+            <a:schemeClr val="tx1"/>
+          </a:solidFill>
+          <a:latin typeface="+mn-lt"/>
+          <a:ea typeface="+mn-ea"/>
+          <a:cs typeface="+mn-cs"/>
+        </a:defRPr>
+      </a:lvl3pPr>
+      <a:lvl4pPr marL="1600200" indent="-228600" algn="l" defTabSz="914400" rtl="0" eaLnBrk="1" latinLnBrk="0" hangingPunct="1">
+        <a:lnSpc>
+          <a:spcPct val="90000"/>
+        </a:lnSpc>
+        <a:spcBef>
+          <a:spcPts val="500"/>
+        </a:spcBef>
+        <a:buFont typeface="Arial" panose="020B0604020202020204" pitchFamily="34" charset="0"/>
+        <a:buChar char="•"/>
+        <a:defRPr sz="1800" kern="1200">
+          <a:solidFill>
+            <a:schemeClr val="tx1"/>
+          </a:solidFill>
+          <a:latin typeface="+mn-lt"/>
+          <a:ea typeface="+mn-ea"/>
+          <a:cs typeface="+mn-cs"/>
+        </a:defRPr>
+      </a:lvl4pPr>
+      <a:lvl5pPr marL="2057400" indent="-228600" algn="l" defTabSz="914400" rtl="0" eaLnBrk="1" latinLnBrk="0" hangingPunct="1">
+        <a:lnSpc>
+          <a:spcPct val="90000"/>
+        </a:lnSpc>
+        <a:spcBef>
+          <a:spcPts val="500"/>
+        </a:spcBef>
+        <a:buFont typeface="Arial" panose="020B0604020202020204" pitchFamily="34" charset="0"/>
+        <a:buChar char="•"/>
+        <a:defRPr sz="1800" kern="1200">
+          <a:solidFill>
+            <a:schemeClr val="tx1"/>
+          </a:solidFill>
+          <a:latin typeface="+mn-lt"/>
+          <a:ea typeface="+mn-ea"/>
+          <a:cs typeface="+mn-cs"/>
+        </a:defRPr>
+      </a:lvl5pPr>
+      <a:lvl6pPr marL="2514600" indent="-228600" algn="l" defTabSz="914400" rtl="0" eaLnBrk="1" latinLnBrk="0" hangingPunct="1">
+        <a:lnSpc>
+          <a:spcPct val="90000"/>
+        </a:lnSpc>
+        <a:spcBef>
+          <a:spcPts val="500"/>
+        </a:spcBef>
+        <a:buFont typeface="Arial" panose="020B0604020202020204" pitchFamily="34" charset="0"/>
+        <a:buChar char="•"/>
+        <a:defRPr sz="1800" kern="1200">
+          <a:solidFill>
+            <a:schemeClr val="tx1"/>
+          </a:solidFill>
+          <a:latin typeface="+mn-lt"/>
+          <a:ea typeface="+mn-ea"/>
+          <a:cs typeface="+mn-cs"/>
+        </a:defRPr>
+      </a:lvl6pPr>
+      <a:lvl7pPr marL="2971800" indent="-228600" algn="l" defTabSz="914400" rtl="0" eaLnBrk="1" latinLnBrk="0" hangingPunct="1">
+        <a:lnSpc>
+          <a:spcPct val="90000"/>
+        </a:lnSpc>
+        <a:spcBef>
+          <a:spcPts val="500"/>
+        </a:spcBef>
+        <a:buFont typeface="Arial" panose="020B0604020202020204" pitchFamily="34" charset="0"/>
+        <a:buChar char="•"/>
+        <a:defRPr sz="1800" kern="1200">
+          <a:solidFill>
+            <a:schemeClr val="tx1"/>
+          </a:solidFill>
+          <a:latin typeface="+mn-lt"/>
+          <a:ea typeface="+mn-ea"/>
+          <a:cs typeface="+mn-cs"/>
+        </a:defRPr>
+      </a:lvl7pPr>
+      <a:lvl8pPr marL="3429000" indent="-228600" algn="l" defTabSz="914400" rtl="0" eaLnBrk="1" latinLnBrk="0" hangingPunct="1">
+        <a:lnSpc>
+          <a:spcPct val="90000"/>
+        </a:lnSpc>
+        <a:spcBef>
+          <a:spcPts val="500"/>
+        </a:spcBef>
+        <a:buFont typeface="Arial" panose="020B0604020202020204" pitchFamily="34" charset="0"/>
+        <a:buChar char="•"/>
+        <a:defRPr sz="1800" kern="1200">
+          <a:solidFill>
+            <a:schemeClr val="tx1"/>
+          </a:solidFill>
+          <a:latin typeface="+mn-lt"/>
+          <a:ea typeface="+mn-ea"/>
+          <a:cs typeface="+mn-cs"/>
+        </a:defRPr>
+      </a:lvl8pPr>
+      <a:lvl9pPr marL="3886200" indent="-228600" algn="l" defTabSz="914400" rtl="0" eaLnBrk="1" latinLnBrk="0" hangingPunct="1">
+        <a:lnSpc>
+          <a:spcPct val="90000"/>
+        </a:lnSpc>
+        <a:spcBef>
+          <a:spcPts val="500"/>
+        </a:spcBef>
+        <a:buFont typeface="Arial" panose="020B0604020202020204" pitchFamily="34" charset="0"/>
+        <a:buChar char="•"/>
+        <a:defRPr sz="1800" kern="1200">
+          <a:solidFill>
+            <a:schemeClr val="tx1"/>
+          </a:solidFill>
+          <a:latin typeface="+mn-lt"/>
+          <a:ea typeface="+mn-ea"/>
+          <a:cs typeface="+mn-cs"/>
+        </a:defRPr>
+      </a:lvl9pPr>
+    </p:bodyStyle>
+    <p:otherStyle>
+      <a:defPPr>
+        <a:defRPr lang="en-US"/>
+      </a:defPPr>
+      <a:lvl1pPr marL="0" algn="l" defTabSz="914400" rtl="0" eaLnBrk="1" latinLnBrk="0" hangingPunct="1">
+        <a:defRPr sz="1800" kern="1200">
+          <a:solidFill>
+            <a:schemeClr val="tx1"/>
+          </a:solidFill>
+          <a:latin typeface="+mn-lt"/>
+          <a:ea typeface="+mn-ea"/>
+          <a:cs typeface="+mn-cs"/>
+        </a:defRPr>
+      </a:lvl1pPr>
+      <a:lvl2pPr marL="457200" algn="l" defTabSz="914400" rtl="0" eaLnBrk="1" latinLnBrk="0" hangingPunct="1">
+        <a:defRPr sz="1800" kern="1200">
+          <a:solidFill>
+            <a:schemeClr val="tx1"/>
+          </a:solidFill>
+          <a:latin typeface="+mn-lt"/>
+          <a:ea typeface="+mn-ea"/>
+          <a:cs typeface="+mn-cs"/>
+        </a:defRPr>
+      </a:lvl2pPr>
+      <a:lvl3pPr marL="914400" algn="l" defTabSz="914400" rtl="0" eaLnBrk="1" latinLnBrk="0" hangingPunct="1">
+        <a:defRPr sz="1800" kern="1200">
+          <a:solidFill>
+            <a:schemeClr val="tx1"/>
+          </a:solidFill>
+          <a:latin typeface="+mn-lt"/>
+          <a:ea typeface="+mn-ea"/>
+          <a:cs typeface="+mn-cs"/>
+        </a:defRPr>
+      </a:lvl3pPr>
+      <a:lvl4pPr marL="1371600" algn="l" defTabSz="914400" rtl="0" eaLnBrk="1" latinLnBrk="0" hangingPunct="1">
+        <a:defRPr sz="1800" kern="1200">
+          <a:solidFill>
+            <a:schemeClr val="tx1"/>
+          </a:solidFill>
+          <a:latin typeface="+mn-lt"/>
+          <a:ea typeface="+mn-ea"/>
+          <a:cs typeface="+mn-cs"/>
+        </a:defRPr>
+      </a:lvl4pPr>
+      <a:lvl5pPr marL="1828800" algn="l" defTabSz="914400" rtl="0" eaLnBrk="1" latinLnBrk="0" hangingPunct="1">
+        <a:defRPr sz="1800" kern="1200">
+          <a:solidFill>
+            <a:schemeClr val="tx1"/>
+          </a:solidFill>
+          <a:latin typeface="+mn-lt"/>
+          <a:ea typeface="+mn-ea"/>
+          <a:cs typeface="+mn-cs"/>
+        </a:defRPr>
+      </a:lvl5pPr>
+      <a:lvl6pPr marL="2286000" algn="l" defTabSz="914400" rtl="0" eaLnBrk="1" latinLnBrk="0" hangingPunct="1">
+        <a:defRPr sz="1800" kern="1200">
+          <a:solidFill>
+            <a:schemeClr val="tx1"/>
+          </a:solidFill>
+          <a:latin typeface="+mn-lt"/>
+          <a:ea typeface="+mn-ea"/>
+          <a:cs typeface="+mn-cs"/>
+        </a:defRPr>
+      </a:lvl6pPr>
+      <a:lvl7pPr marL="2743200" algn="l" defTabSz="914400" rtl="0" eaLnBrk="1" latinLnBrk="0" hangingPunct="1">
+        <a:defRPr sz="1800" kern="1200">
+          <a:solidFill>
+            <a:schemeClr val="tx1"/>
+          </a:solidFill>
+          <a:latin typeface="+mn-lt"/>
+          <a:ea typeface="+mn-ea"/>
+          <a:cs typeface="+mn-cs"/>
+        </a:defRPr>
+      </a:lvl7pPr>
+      <a:lvl8pPr marL="3200400" algn="l" defTabSz="914400" rtl="0" eaLnBrk="1" latinLnBrk="0" hangingPunct="1">
+        <a:defRPr sz="1800" kern="1200">
+          <a:solidFill>
+            <a:schemeClr val="tx1"/>
+          </a:solidFill>
+          <a:latin typeface="+mn-lt"/>
+          <a:ea typeface="+mn-ea"/>
+          <a:cs typeface="+mn-cs"/>
+        </a:defRPr>
+      </a:lvl8pPr>
+      <a:lvl9pPr marL="3657600" algn="l" defTabSz="914400" rtl="0" eaLnBrk="1" latinLnBrk="0" hangingPunct="1">
+        <a:defRPr sz="1800" kern="1200">
+          <a:solidFill>
+            <a:schemeClr val="tx1"/>
+          </a:solidFill>
+          <a:latin typeface="+mn-lt"/>
+          <a:ea typeface="+mn-ea"/>
+          <a:cs typeface="+mn-cs"/>
+        </a:defRPr>
+      </a:lvl9pPr>
+    </p:otherStyle>
+  </p:txStyles>
+</p:sldMaster>
+</file>
+
 <file path=ppt/slides/slide1.xml><?xml version="1.0" encoding="utf-8"?>
+<p:sld xmlns:a="http://schemas.openxmlformats.org/drawingml/2006/main" xmlns:r="http://schemas.openxmlformats.org/officeDocument/2006/relationships" xmlns:p="http://schemas.openxmlformats.org/presentationml/2006/main" showMasterSp="0">
+  <p:cSld>
+    <p:spTree>
+      <p:nvGrpSpPr>
+        <p:cNvPr id="1" name=""/>
+        <p:cNvGrpSpPr/>
+        <p:nvPr/>
+      </p:nvGrpSpPr>
+      <p:grpSpPr>
+        <a:xfrm>
+          <a:off x="0" y="0"/>
+          <a:ext cx="0" cy="0"/>
+          <a:chOff x="0" y="0"/>
+          <a:chExt cx="0" cy="0"/>
+        </a:xfrm>
+      </p:grpSpPr>
+      <p:sp>
+        <p:nvSpPr>
+          <p:cNvPr id="2" name="Title 1">
+            <a:extLst>
+              <a:ext uri="{FF2B5EF4-FFF2-40B4-BE49-F238E27FC236}">
+                <a16:creationId xmlns:a16="http://schemas.microsoft.com/office/drawing/2014/main" id="{00EEBDCC-EB26-4FB3-B42B-66516F6C2BFA}"/>
+              </a:ext>
+            </a:extLst>
+          </p:cNvPr>
+          <p:cNvSpPr>
+            <a:spLocks noGrp="1"/>
+          </p:cNvSpPr>
+          <p:nvPr>
+            <p:ph type="ctrTitle"/>
+          </p:nvPr>
+        </p:nvSpPr>
+        <p:spPr>
+          <a:xfrm>
+            <a:off x="387350" y="2438396"/>
+            <a:ext cx="11417300" cy="1795978"/>
+          </a:xfrm>
+        </p:spPr>
+        <p:txBody>
+          <a:bodyPr/>
+          <a:lstStyle/>
+          <a:p>
+            <a:pPr>
+              <a:lnSpc>
+                <a:spcPct val="150000"/>
+              </a:lnSpc>
+            </a:pPr>
+            <a:r>
+              <a:rPr kumimoji="0" lang="en-US" sz="4000" b="1" i="0" u="none" strike="noStrike" kern="1200" cap="none" spc="0" normalizeH="0" baseline="0" noProof="0" dirty="0">
+                <a:ln>
+                  <a:noFill/>
+                </a:ln>
+                <a:effectLst/>
+                <a:uLnTx/>
+                <a:uFillTx/>
+                <a:latin typeface="Garamond" panose="02020404030301010803" pitchFamily="18" charset="0"/>
+                <a:ea typeface="+mj-ea"/>
+                <a:cs typeface="+mj-cs"/>
+              </a:rPr>
+              <a:t>Energy Management for Train Operation</a:t>
+            </a:r>
+            <a:br>
+              <a:rPr kumimoji="0" lang="en-US" sz="4000" b="1" i="0" u="none" strike="noStrike" kern="1200" cap="none" spc="0" normalizeH="0" baseline="0" noProof="0" dirty="0">
+                <a:ln>
+                  <a:noFill/>
+                </a:ln>
+                <a:effectLst/>
+                <a:uLnTx/>
+                <a:uFillTx/>
+                <a:latin typeface="Garamond" panose="02020404030301010803" pitchFamily="18" charset="0"/>
+                <a:ea typeface="+mj-ea"/>
+                <a:cs typeface="+mj-cs"/>
+              </a:rPr>
+            </a:br>
+            <a:r>
+              <a:rPr kumimoji="0" lang="en-US" sz="2800" b="1" i="0" u="none" strike="noStrike" kern="1200" cap="none" spc="0" normalizeH="0" baseline="0" noProof="0" dirty="0">
+                <a:ln>
+                  <a:noFill/>
+                </a:ln>
+                <a:effectLst/>
+                <a:uLnTx/>
+                <a:uFillTx/>
+                <a:latin typeface="Garamond" panose="02020404030301010803" pitchFamily="18" charset="0"/>
+                <a:ea typeface="+mj-ea"/>
+                <a:cs typeface="+mj-cs"/>
+              </a:rPr>
+              <a:t> </a:t>
+            </a:r>
+            <a:r>
+              <a:rPr kumimoji="0" lang="en-US" sz="3200" b="1" i="0" u="none" strike="noStrike" kern="1200" cap="none" spc="0" normalizeH="0" baseline="0" noProof="0" dirty="0">
+                <a:ln>
+                  <a:noFill/>
+                </a:ln>
+                <a:effectLst/>
+                <a:uLnTx/>
+                <a:uFillTx/>
+                <a:latin typeface="Garamond" panose="02020404030301010803" pitchFamily="18" charset="0"/>
+                <a:ea typeface="+mj-ea"/>
+                <a:cs typeface="+mj-cs"/>
+              </a:rPr>
+              <a:t>in a </a:t>
+            </a:r>
+            <a:r>
+              <a:rPr kumimoji="0" lang="en-US" sz="3200" b="1" i="0" u="none" strike="noStrike" kern="1200" cap="none" spc="0" normalizeH="0" baseline="0" noProof="0">
+                <a:ln>
+                  <a:noFill/>
+                </a:ln>
+                <a:effectLst/>
+                <a:uLnTx/>
+                <a:uFillTx/>
+                <a:latin typeface="Garamond" panose="02020404030301010803" pitchFamily="18" charset="0"/>
+                <a:ea typeface="+mj-ea"/>
+                <a:cs typeface="+mj-cs"/>
+              </a:rPr>
+              <a:t>Sustainable Environment</a:t>
+            </a:r>
+            <a:endParaRPr lang="nl-NL" dirty="0"/>
+          </a:p>
+        </p:txBody>
+      </p:sp>
+      <p:pic>
+        <p:nvPicPr>
+          <p:cNvPr id="7" name="Picture 6" descr="Text&#10;&#10;Description automatically generated">
+            <a:extLst>
+              <a:ext uri="{FF2B5EF4-FFF2-40B4-BE49-F238E27FC236}">
+                <a16:creationId xmlns:a16="http://schemas.microsoft.com/office/drawing/2014/main" id="{75F4370B-ECA9-4080-9AB3-4C88E06AD5E4}"/>
+              </a:ext>
+            </a:extLst>
+          </p:cNvPr>
+          <p:cNvPicPr>
+            <a:picLocks noChangeAspect="1"/>
+          </p:cNvPicPr>
+          <p:nvPr/>
+        </p:nvPicPr>
+        <p:blipFill rotWithShape="1">
+          <a:blip r:embed="rId2">
+            <a:extLst>
+              <a:ext uri="{28A0092B-C50C-407E-A947-70E740481C1C}">
+                <a14:useLocalDpi xmlns:a14="http://schemas.microsoft.com/office/drawing/2010/main" val="0"/>
+              </a:ext>
+            </a:extLst>
+          </a:blip>
+          <a:srcRect l="8426" t="11209" r="7703" b="14442"/>
+          <a:stretch/>
+        </p:blipFill>
+        <p:spPr>
+          <a:xfrm>
+            <a:off x="586748" y="157852"/>
+            <a:ext cx="2676827" cy="1186482"/>
+          </a:xfrm>
+          <a:prstGeom prst="rect">
+            <a:avLst/>
+          </a:prstGeom>
+        </p:spPr>
+      </p:pic>
+      <p:sp>
+        <p:nvSpPr>
+          <p:cNvPr id="3" name="Title 1">
+            <a:extLst>
+              <a:ext uri="{FF2B5EF4-FFF2-40B4-BE49-F238E27FC236}">
+                <a16:creationId xmlns:a16="http://schemas.microsoft.com/office/drawing/2014/main" id="{F453EEC9-4226-556C-189C-DEFD2D77A473}"/>
+              </a:ext>
+            </a:extLst>
+          </p:cNvPr>
+          <p:cNvSpPr txBox="1">
+            <a:spLocks/>
+          </p:cNvSpPr>
+          <p:nvPr/>
+        </p:nvSpPr>
+        <p:spPr>
+          <a:xfrm>
+            <a:off x="387350" y="3942937"/>
+            <a:ext cx="11417300" cy="1795978"/>
+          </a:xfrm>
+        </p:spPr>
+        <p:txBody>
+          <a:bodyPr anchor="b"/>
+          <a:lstStyle>
+            <a:lvl1pPr algn="ctr" defTabSz="914400" rtl="0" eaLnBrk="1" latinLnBrk="0" hangingPunct="1">
+              <a:lnSpc>
+                <a:spcPct val="90000"/>
+              </a:lnSpc>
+              <a:spcBef>
+                <a:spcPct val="0"/>
+              </a:spcBef>
+              <a:buNone/>
+              <a:defRPr sz="6000" b="1" i="0" kern="1200" cap="all" baseline="0">
+                <a:solidFill>
+                  <a:schemeClr val="tx1"/>
+                </a:solidFill>
+                <a:latin typeface="Arial Narrow" panose="020B0606020202030204" pitchFamily="34" charset="0"/>
+                <a:ea typeface="+mj-ea"/>
+                <a:cs typeface="+mj-cs"/>
+              </a:defRPr>
+            </a:lvl1pPr>
+          </a:lstStyle>
+          <a:p>
+            <a:pPr>
+              <a:lnSpc>
+                <a:spcPct val="150000"/>
+              </a:lnSpc>
+            </a:pPr>
+            <a:r>
+              <a:rPr lang="en-US" sz="2800" cap="none" dirty="0">
+                <a:latin typeface="Garamond" panose="02020404030301010803" pitchFamily="18" charset="0"/>
+              </a:rPr>
+              <a:t>Presenter: Hamed Darbandi</a:t>
+            </a:r>
+            <a:endParaRPr lang="nl-NL" sz="4400" dirty="0"/>
+          </a:p>
+        </p:txBody>
+      </p:sp>
+      <p:pic>
+        <p:nvPicPr>
+          <p:cNvPr id="1026" name="Picture 2">
+            <a:extLst>
+              <a:ext uri="{FF2B5EF4-FFF2-40B4-BE49-F238E27FC236}">
+                <a16:creationId xmlns:a16="http://schemas.microsoft.com/office/drawing/2014/main" id="{73425EF9-A19B-BC0E-A132-07E86B608FF0}"/>
+              </a:ext>
+            </a:extLst>
+          </p:cNvPr>
+          <p:cNvPicPr>
+            <a:picLocks noChangeAspect="1" noChangeArrowheads="1"/>
+          </p:cNvPicPr>
+          <p:nvPr/>
+        </p:nvPicPr>
+        <p:blipFill>
+          <a:blip r:embed="rId3">
+            <a:extLst>
+              <a:ext uri="{28A0092B-C50C-407E-A947-70E740481C1C}">
+                <a14:useLocalDpi xmlns:a14="http://schemas.microsoft.com/office/drawing/2010/main" val="0"/>
+              </a:ext>
+            </a:extLst>
+          </a:blip>
+          <a:srcRect/>
+          <a:stretch>
+            <a:fillRect/>
+          </a:stretch>
+        </p:blipFill>
+        <p:spPr bwMode="auto">
+          <a:xfrm>
+            <a:off x="4151980" y="398036"/>
+            <a:ext cx="1722356" cy="777387"/>
+          </a:xfrm>
+          <a:prstGeom prst="rect">
+            <a:avLst/>
+          </a:prstGeom>
+          <a:noFill/>
+          <a:extLst>
+            <a:ext uri="{909E8E84-426E-40DD-AFC4-6F175D3DCCD1}">
+              <a14:hiddenFill xmlns:a14="http://schemas.microsoft.com/office/drawing/2010/main">
+                <a:solidFill>
+                  <a:srgbClr val="FFFFFF"/>
+                </a:solidFill>
+              </a14:hiddenFill>
+            </a:ext>
+          </a:extLst>
+        </p:spPr>
+      </p:pic>
+      <p:pic>
+        <p:nvPicPr>
+          <p:cNvPr id="4" name="Picture 2">
+            <a:extLst>
+              <a:ext uri="{FF2B5EF4-FFF2-40B4-BE49-F238E27FC236}">
+                <a16:creationId xmlns:a16="http://schemas.microsoft.com/office/drawing/2014/main" id="{7309573D-4456-0D27-8573-B180BDB0AECD}"/>
+              </a:ext>
+            </a:extLst>
+          </p:cNvPr>
+          <p:cNvPicPr>
+            <a:picLocks noChangeAspect="1" noChangeArrowheads="1"/>
+          </p:cNvPicPr>
+          <p:nvPr/>
+        </p:nvPicPr>
+        <p:blipFill>
+          <a:blip r:embed="rId4">
+            <a:extLst>
+              <a:ext uri="{28A0092B-C50C-407E-A947-70E740481C1C}">
+                <a14:useLocalDpi xmlns:a14="http://schemas.microsoft.com/office/drawing/2010/main" val="0"/>
+              </a:ext>
+            </a:extLst>
+          </a:blip>
+          <a:srcRect/>
+          <a:stretch>
+            <a:fillRect/>
+          </a:stretch>
+        </p:blipFill>
+        <p:spPr bwMode="auto">
+          <a:xfrm>
+            <a:off x="9505525" y="534711"/>
+            <a:ext cx="1570193" cy="619264"/>
+          </a:xfrm>
+          <a:prstGeom prst="rect">
+            <a:avLst/>
+          </a:prstGeom>
+          <a:noFill/>
+          <a:extLst>
+            <a:ext uri="{909E8E84-426E-40DD-AFC4-6F175D3DCCD1}">
+              <a14:hiddenFill xmlns:a14="http://schemas.microsoft.com/office/drawing/2010/main">
+                <a:solidFill>
+                  <a:srgbClr val="FFFFFF"/>
+                </a:solidFill>
+              </a14:hiddenFill>
+            </a:ext>
+          </a:extLst>
+        </p:spPr>
+      </p:pic>
+      <p:pic>
+        <p:nvPicPr>
+          <p:cNvPr id="1030" name="Picture 6">
+            <a:extLst>
+              <a:ext uri="{FF2B5EF4-FFF2-40B4-BE49-F238E27FC236}">
+                <a16:creationId xmlns:a16="http://schemas.microsoft.com/office/drawing/2014/main" id="{03A902DD-C93C-15DA-A7BF-485A95242FF9}"/>
+              </a:ext>
+            </a:extLst>
+          </p:cNvPr>
+          <p:cNvPicPr>
+            <a:picLocks noChangeAspect="1" noChangeArrowheads="1"/>
+          </p:cNvPicPr>
+          <p:nvPr/>
+        </p:nvPicPr>
+        <p:blipFill>
+          <a:blip r:embed="rId5">
+            <a:extLst>
+              <a:ext uri="{28A0092B-C50C-407E-A947-70E740481C1C}">
+                <a14:useLocalDpi xmlns:a14="http://schemas.microsoft.com/office/drawing/2010/main" val="0"/>
+              </a:ext>
+            </a:extLst>
+          </a:blip>
+          <a:srcRect/>
+          <a:stretch>
+            <a:fillRect/>
+          </a:stretch>
+        </p:blipFill>
+        <p:spPr bwMode="auto">
+          <a:xfrm>
+            <a:off x="6768529" y="615411"/>
+            <a:ext cx="1947504" cy="465956"/>
+          </a:xfrm>
+          <a:prstGeom prst="rect">
+            <a:avLst/>
+          </a:prstGeom>
+          <a:noFill/>
+          <a:extLst>
+            <a:ext uri="{909E8E84-426E-40DD-AFC4-6F175D3DCCD1}">
+              <a14:hiddenFill xmlns:a14="http://schemas.microsoft.com/office/drawing/2010/main">
+                <a:solidFill>
+                  <a:srgbClr val="FFFFFF"/>
+                </a:solidFill>
+              </a14:hiddenFill>
+            </a:ext>
+          </a:extLst>
+        </p:spPr>
+      </p:pic>
+    </p:spTree>
+    <p:extLst>
+      <p:ext uri="{BB962C8B-B14F-4D97-AF65-F5344CB8AC3E}">
+        <p14:creationId xmlns:p14="http://schemas.microsoft.com/office/powerpoint/2010/main" val="2289031963"/>
+      </p:ext>
+    </p:extLst>
+  </p:cSld>
+  <p:clrMapOvr>
+    <a:masterClrMapping/>
+  </p:clrMapOvr>
+</p:sld>
+</file>
+
+<file path=ppt/slides/slide2.xml><?xml version="1.0" encoding="utf-8"?>
 <p:sld xmlns:a="http://schemas.openxmlformats.org/drawingml/2006/main" xmlns:r="http://schemas.openxmlformats.org/officeDocument/2006/relationships" xmlns:p="http://schemas.openxmlformats.org/presentationml/2006/main">
   <p:cSld>
     <p:bg>
@@ -11061,7 +12290,7 @@
 </p:sld>
 </file>
 
-<file path=ppt/slides/slide2.xml><?xml version="1.0" encoding="utf-8"?>
+<file path=ppt/slides/slide3.xml><?xml version="1.0" encoding="utf-8"?>
 <p:sld xmlns:a="http://schemas.openxmlformats.org/drawingml/2006/main" xmlns:r="http://schemas.openxmlformats.org/officeDocument/2006/relationships" xmlns:p="http://schemas.openxmlformats.org/presentationml/2006/main">
   <p:cSld>
     <p:bg>
@@ -11188,6 +12417,99 @@
     <p:extLst>
       <p:ext uri="{BB962C8B-B14F-4D97-AF65-F5344CB8AC3E}">
         <p14:creationId xmlns:p14="http://schemas.microsoft.com/office/powerpoint/2010/main" val="226859821"/>
+      </p:ext>
+    </p:extLst>
+  </p:cSld>
+  <p:clrMapOvr>
+    <a:masterClrMapping/>
+  </p:clrMapOvr>
+</p:sld>
+</file>
+
+<file path=ppt/slides/slide4.xml><?xml version="1.0" encoding="utf-8"?>
+<p:sld xmlns:a="http://schemas.openxmlformats.org/drawingml/2006/main" xmlns:r="http://schemas.openxmlformats.org/officeDocument/2006/relationships" xmlns:p="http://schemas.openxmlformats.org/presentationml/2006/main">
+  <p:cSld>
+    <p:spTree>
+      <p:nvGrpSpPr>
+        <p:cNvPr id="1" name=""/>
+        <p:cNvGrpSpPr/>
+        <p:nvPr/>
+      </p:nvGrpSpPr>
+      <p:grpSpPr>
+        <a:xfrm>
+          <a:off x="0" y="0"/>
+          <a:ext cx="0" cy="0"/>
+          <a:chOff x="0" y="0"/>
+          <a:chExt cx="0" cy="0"/>
+        </a:xfrm>
+      </p:grpSpPr>
+      <p:sp>
+        <p:nvSpPr>
+          <p:cNvPr id="2" name="Title 1">
+            <a:extLst>
+              <a:ext uri="{FF2B5EF4-FFF2-40B4-BE49-F238E27FC236}">
+                <a16:creationId xmlns:a16="http://schemas.microsoft.com/office/drawing/2014/main" id="{96887403-1A6D-48AA-DFAB-1649BBA144C7}"/>
+              </a:ext>
+            </a:extLst>
+          </p:cNvPr>
+          <p:cNvSpPr>
+            <a:spLocks noGrp="1"/>
+          </p:cNvSpPr>
+          <p:nvPr>
+            <p:ph type="title"/>
+          </p:nvPr>
+        </p:nvSpPr>
+        <p:spPr/>
+        <p:txBody>
+          <a:bodyPr/>
+          <a:lstStyle/>
+          <a:p>
+            <a:r>
+              <a:rPr lang="en-US" dirty="0"/>
+              <a:t>Flowchart</a:t>
+            </a:r>
+          </a:p>
+        </p:txBody>
+      </p:sp>
+      <p:pic>
+        <p:nvPicPr>
+          <p:cNvPr id="5" name="Content Placeholder 4" descr="A diagram of energy management model&#10;&#10;AI-generated content may be incorrect.">
+            <a:extLst>
+              <a:ext uri="{FF2B5EF4-FFF2-40B4-BE49-F238E27FC236}">
+                <a16:creationId xmlns:a16="http://schemas.microsoft.com/office/drawing/2014/main" id="{03D39276-A5BD-C050-807D-E446FCB4D0EC}"/>
+              </a:ext>
+            </a:extLst>
+          </p:cNvPr>
+          <p:cNvPicPr>
+            <a:picLocks noGrp="1" noChangeAspect="1"/>
+          </p:cNvPicPr>
+          <p:nvPr>
+            <p:ph idx="1"/>
+          </p:nvPr>
+        </p:nvPicPr>
+        <p:blipFill>
+          <a:blip r:embed="rId2">
+            <a:extLst>
+              <a:ext uri="{28A0092B-C50C-407E-A947-70E740481C1C}">
+                <a14:useLocalDpi xmlns:a14="http://schemas.microsoft.com/office/drawing/2010/main" val="0"/>
+              </a:ext>
+            </a:extLst>
+          </a:blip>
+          <a:stretch>
+            <a:fillRect/>
+          </a:stretch>
+        </p:blipFill>
+        <p:spPr>
+          <a:xfrm>
+            <a:off x="2067301" y="1825625"/>
+            <a:ext cx="8057397" cy="4351338"/>
+          </a:xfrm>
+        </p:spPr>
+      </p:pic>
+    </p:spTree>
+    <p:extLst>
+      <p:ext uri="{BB962C8B-B14F-4D97-AF65-F5344CB8AC3E}">
+        <p14:creationId xmlns:p14="http://schemas.microsoft.com/office/powerpoint/2010/main" val="1117176596"/>
       </p:ext>
     </p:extLst>
   </p:cSld>
@@ -11510,4 +12832,265 @@
     </a:ext>
   </a:extLst>
 </a:theme>
+</file>
+
+<file path=ppt/theme/theme2.xml><?xml version="1.0" encoding="utf-8"?>
+<a:theme xmlns:a="http://schemas.openxmlformats.org/drawingml/2006/main" name="UT Title slide White">
+  <a:themeElements>
+    <a:clrScheme name="UT colors">
+      <a:dk1>
+        <a:srgbClr val="000000"/>
+      </a:dk1>
+      <a:lt1>
+        <a:srgbClr val="FFFFFF"/>
+      </a:lt1>
+      <a:dk2>
+        <a:srgbClr val="616365"/>
+      </a:dk2>
+      <a:lt2>
+        <a:srgbClr val="ADAFAF"/>
+      </a:lt2>
+      <a:accent1>
+        <a:srgbClr val="63B1E5"/>
+      </a:accent1>
+      <a:accent2>
+        <a:srgbClr val="EC7908"/>
+      </a:accent2>
+      <a:accent3>
+        <a:srgbClr val="CF0071"/>
+      </a:accent3>
+      <a:accent4>
+        <a:srgbClr val="FED100"/>
+      </a:accent4>
+      <a:accent5>
+        <a:srgbClr val="0093B3"/>
+      </a:accent5>
+      <a:accent6>
+        <a:srgbClr val="34B234"/>
+      </a:accent6>
+      <a:hlink>
+        <a:srgbClr val="002C5F"/>
+      </a:hlink>
+      <a:folHlink>
+        <a:srgbClr val="C60C30"/>
+      </a:folHlink>
+    </a:clrScheme>
+    <a:fontScheme name="Arial">
+      <a:majorFont>
+        <a:latin typeface="Arial" panose="020B0604020202020204"/>
+        <a:ea typeface=""/>
+        <a:cs typeface=""/>
+        <a:font script="Jpan" typeface="ＭＳ Ｐゴシック"/>
+        <a:font script="Hang" typeface="굴림"/>
+        <a:font script="Hans" typeface="黑体"/>
+        <a:font script="Hant" typeface="微軟正黑體"/>
+        <a:font script="Arab" typeface="Arial"/>
+        <a:font script="Hebr" typeface="Arial"/>
+        <a:font script="Thai" typeface="Cordia New"/>
+        <a:font script="Ethi" typeface="Nyala"/>
+        <a:font script="Beng" typeface="Vrinda"/>
+        <a:font script="Gujr" typeface="Shruti"/>
+        <a:font script="Khmr" typeface="DaunPenh"/>
+        <a:font script="Knda" typeface="Tunga"/>
+        <a:font script="Guru" typeface="Raavi"/>
+        <a:font script="Cans" typeface="Euphemia"/>
+        <a:font script="Cher" typeface="Plantagenet Cherokee"/>
+        <a:font script="Yiii" typeface="Microsoft Yi Baiti"/>
+        <a:font script="Tibt" typeface="Microsoft Himalaya"/>
+        <a:font script="Thaa" typeface="MV Boli"/>
+        <a:font script="Deva" typeface="Mangal"/>
+        <a:font script="Telu" typeface="Gautami"/>
+        <a:font script="Taml" typeface="Latha"/>
+        <a:font script="Syrc" typeface="Estrangelo Edessa"/>
+        <a:font script="Orya" typeface="Kalinga"/>
+        <a:font script="Mlym" typeface="Kartika"/>
+        <a:font script="Laoo" typeface="DokChampa"/>
+        <a:font script="Sinh" typeface="Iskoola Pota"/>
+        <a:font script="Mong" typeface="Mongolian Baiti"/>
+        <a:font script="Viet" typeface="Arial"/>
+        <a:font script="Uigh" typeface="Microsoft Uighur"/>
+        <a:font script="Geor" typeface="Sylfaen"/>
+      </a:majorFont>
+      <a:minorFont>
+        <a:latin typeface="Arial" panose="020B0604020202020204"/>
+        <a:ea typeface=""/>
+        <a:cs typeface=""/>
+        <a:font script="Jpan" typeface="ＭＳ Ｐゴシック"/>
+        <a:font script="Hang" typeface="굴림"/>
+        <a:font script="Hans" typeface="黑体"/>
+        <a:font script="Hant" typeface="微軟正黑體"/>
+        <a:font script="Arab" typeface="Arial"/>
+        <a:font script="Hebr" typeface="Arial"/>
+        <a:font script="Thai" typeface="Cordia New"/>
+        <a:font script="Ethi" typeface="Nyala"/>
+        <a:font script="Beng" typeface="Vrinda"/>
+        <a:font script="Gujr" typeface="Shruti"/>
+        <a:font script="Khmr" typeface="DaunPenh"/>
+        <a:font script="Knda" typeface="Tunga"/>
+        <a:font script="Guru" typeface="Raavi"/>
+        <a:font script="Cans" typeface="Euphemia"/>
+        <a:font script="Cher" typeface="Plantagenet Cherokee"/>
+        <a:font script="Yiii" typeface="Microsoft Yi Baiti"/>
+        <a:font script="Tibt" typeface="Microsoft Himalaya"/>
+        <a:font script="Thaa" typeface="MV Boli"/>
+        <a:font script="Deva" typeface="Mangal"/>
+        <a:font script="Telu" typeface="Gautami"/>
+        <a:font script="Taml" typeface="Latha"/>
+        <a:font script="Syrc" typeface="Estrangelo Edessa"/>
+        <a:font script="Orya" typeface="Kalinga"/>
+        <a:font script="Mlym" typeface="Kartika"/>
+        <a:font script="Laoo" typeface="DokChampa"/>
+        <a:font script="Sinh" typeface="Iskoola Pota"/>
+        <a:font script="Mong" typeface="Mongolian Baiti"/>
+        <a:font script="Viet" typeface="Arial"/>
+        <a:font script="Uigh" typeface="Microsoft Uighur"/>
+        <a:font script="Geor" typeface="Sylfaen"/>
+      </a:minorFont>
+    </a:fontScheme>
+    <a:fmtScheme name="Office Theme">
+      <a:fillStyleLst>
+        <a:solidFill>
+          <a:schemeClr val="phClr"/>
+        </a:solidFill>
+        <a:gradFill rotWithShape="1">
+          <a:gsLst>
+            <a:gs pos="0">
+              <a:schemeClr val="phClr">
+                <a:lumMod val="110000"/>
+                <a:satMod val="105000"/>
+                <a:tint val="67000"/>
+              </a:schemeClr>
+            </a:gs>
+            <a:gs pos="50000">
+              <a:schemeClr val="phClr">
+                <a:lumMod val="105000"/>
+                <a:satMod val="103000"/>
+                <a:tint val="73000"/>
+              </a:schemeClr>
+            </a:gs>
+            <a:gs pos="100000">
+              <a:schemeClr val="phClr">
+                <a:lumMod val="105000"/>
+                <a:satMod val="109000"/>
+                <a:tint val="81000"/>
+              </a:schemeClr>
+            </a:gs>
+          </a:gsLst>
+          <a:lin ang="5400000" scaled="0"/>
+        </a:gradFill>
+        <a:gradFill rotWithShape="1">
+          <a:gsLst>
+            <a:gs pos="0">
+              <a:schemeClr val="phClr">
+                <a:satMod val="103000"/>
+                <a:lumMod val="102000"/>
+                <a:tint val="94000"/>
+              </a:schemeClr>
+            </a:gs>
+            <a:gs pos="50000">
+              <a:schemeClr val="phClr">
+                <a:satMod val="110000"/>
+                <a:lumMod val="100000"/>
+                <a:shade val="100000"/>
+              </a:schemeClr>
+            </a:gs>
+            <a:gs pos="100000">
+              <a:schemeClr val="phClr">
+                <a:lumMod val="99000"/>
+                <a:satMod val="120000"/>
+                <a:shade val="78000"/>
+              </a:schemeClr>
+            </a:gs>
+          </a:gsLst>
+          <a:lin ang="5400000" scaled="0"/>
+        </a:gradFill>
+      </a:fillStyleLst>
+      <a:lnStyleLst>
+        <a:ln w="6350" cap="flat" cmpd="sng" algn="ctr">
+          <a:solidFill>
+            <a:schemeClr val="phClr"/>
+          </a:solidFill>
+          <a:prstDash val="solid"/>
+          <a:miter lim="800000"/>
+        </a:ln>
+        <a:ln w="12700" cap="flat" cmpd="sng" algn="ctr">
+          <a:solidFill>
+            <a:schemeClr val="phClr"/>
+          </a:solidFill>
+          <a:prstDash val="solid"/>
+          <a:miter lim="800000"/>
+        </a:ln>
+        <a:ln w="19050" cap="flat" cmpd="sng" algn="ctr">
+          <a:solidFill>
+            <a:schemeClr val="phClr"/>
+          </a:solidFill>
+          <a:prstDash val="solid"/>
+          <a:miter lim="800000"/>
+        </a:ln>
+      </a:lnStyleLst>
+      <a:effectStyleLst>
+        <a:effectStyle>
+          <a:effectLst/>
+        </a:effectStyle>
+        <a:effectStyle>
+          <a:effectLst/>
+        </a:effectStyle>
+        <a:effectStyle>
+          <a:effectLst>
+            <a:outerShdw blurRad="57150" dist="19050" dir="5400000" algn="ctr" rotWithShape="0">
+              <a:srgbClr val="000000">
+                <a:alpha val="63000"/>
+              </a:srgbClr>
+            </a:outerShdw>
+          </a:effectLst>
+        </a:effectStyle>
+      </a:effectStyleLst>
+      <a:bgFillStyleLst>
+        <a:solidFill>
+          <a:schemeClr val="phClr"/>
+        </a:solidFill>
+        <a:solidFill>
+          <a:schemeClr val="phClr">
+            <a:tint val="95000"/>
+            <a:satMod val="170000"/>
+          </a:schemeClr>
+        </a:solidFill>
+        <a:gradFill rotWithShape="1">
+          <a:gsLst>
+            <a:gs pos="0">
+              <a:schemeClr val="phClr">
+                <a:tint val="93000"/>
+                <a:satMod val="150000"/>
+                <a:shade val="98000"/>
+                <a:lumMod val="102000"/>
+              </a:schemeClr>
+            </a:gs>
+            <a:gs pos="50000">
+              <a:schemeClr val="phClr">
+                <a:tint val="98000"/>
+                <a:satMod val="130000"/>
+                <a:shade val="90000"/>
+                <a:lumMod val="103000"/>
+              </a:schemeClr>
+            </a:gs>
+            <a:gs pos="100000">
+              <a:schemeClr val="phClr">
+                <a:shade val="63000"/>
+                <a:satMod val="120000"/>
+              </a:schemeClr>
+            </a:gs>
+          </a:gsLst>
+          <a:lin ang="5400000" scaled="0"/>
+        </a:gradFill>
+      </a:bgFillStyleLst>
+    </a:fmtScheme>
+  </a:themeElements>
+  <a:objectDefaults/>
+  <a:extraClrSchemeLst/>
+  <a:extLst>
+    <a:ext uri="{05A4C25C-085E-4340-85A3-A5531E510DB2}">
+      <thm15:themeFamily xmlns:thm15="http://schemas.microsoft.com/office/thememl/2012/main" name="UT test" id="{15B9D8DC-9424-A541-AF47-D0C4E5DD615D}" vid="{AA5B6583-0830-8041-8FDA-106127B26373}"/>
+    </a:ext>
+  </a:extLst>
+</a:theme>
 </file>
</xml_diff>

<commit_message>
v23: Extracting results for paper. Added new files for running multiple scenarios on driving strategies and Train.py. Added new lines for peak shaving plotting and saving plots from Train_with_PS in different folders.
</commit_message>
<xml_diff>
--- a/Reports/Train_with_PS capabilities_20250728.pptx
+++ b/Reports/Train_with_PS capabilities_20250728.pptx
@@ -119,13 +119,37 @@
 <file path=ppt/revisionInfo.xml><?xml version="1.0" encoding="utf-8"?>
 <p1510:revInfo xmlns:a="http://schemas.openxmlformats.org/drawingml/2006/main" xmlns:r="http://schemas.openxmlformats.org/officeDocument/2006/relationships" xmlns:p1510="http://schemas.microsoft.com/office/powerpoint/2015/10/main">
   <p1510:revLst>
-    <p1510:client id="{72AF2A81-B5F1-4E69-8DE0-BB2C03A25C53}" v="983" dt="2025-07-29T13:59:37.850"/>
+    <p1510:client id="{CD354708-F50B-416D-9857-DEBFBA6FE91E}" v="1" dt="2025-08-27T11:08:56.576"/>
   </p1510:revLst>
 </p1510:revInfo>
 </file>
 
 <file path=ppt/changesInfos/changesInfo1.xml><?xml version="1.0" encoding="utf-8"?>
 <pc:chgInfo xmlns:a="http://schemas.openxmlformats.org/drawingml/2006/main" xmlns:r="http://schemas.openxmlformats.org/officeDocument/2006/relationships" xmlns:ac="http://schemas.microsoft.com/office/drawing/2013/main/command" xmlns:pc="http://schemas.microsoft.com/office/powerpoint/2013/main/command">
+  <pc:docChgLst>
+    <pc:chgData name="Darbandi, Hamed (UT-EEMCS)" userId="14c3e4a7-a657-4d7f-849e-8baaf4839630" providerId="ADAL" clId="{CD354708-F50B-416D-9857-DEBFBA6FE91E}"/>
+    <pc:docChg chg="modSld">
+      <pc:chgData name="Darbandi, Hamed (UT-EEMCS)" userId="14c3e4a7-a657-4d7f-849e-8baaf4839630" providerId="ADAL" clId="{CD354708-F50B-416D-9857-DEBFBA6FE91E}" dt="2025-08-27T11:09:30.481" v="21" actId="6549"/>
+      <pc:docMkLst>
+        <pc:docMk/>
+      </pc:docMkLst>
+      <pc:sldChg chg="modSp mod">
+        <pc:chgData name="Darbandi, Hamed (UT-EEMCS)" userId="14c3e4a7-a657-4d7f-849e-8baaf4839630" providerId="ADAL" clId="{CD354708-F50B-416D-9857-DEBFBA6FE91E}" dt="2025-08-27T11:09:30.481" v="21" actId="6549"/>
+        <pc:sldMkLst>
+          <pc:docMk/>
+          <pc:sldMk cId="2289031963" sldId="261"/>
+        </pc:sldMkLst>
+        <pc:spChg chg="mod">
+          <ac:chgData name="Darbandi, Hamed (UT-EEMCS)" userId="14c3e4a7-a657-4d7f-849e-8baaf4839630" providerId="ADAL" clId="{CD354708-F50B-416D-9857-DEBFBA6FE91E}" dt="2025-08-27T11:09:30.481" v="21" actId="6549"/>
+          <ac:spMkLst>
+            <pc:docMk/>
+            <pc:sldMk cId="2289031963" sldId="261"/>
+            <ac:spMk id="2" creationId="{00EEBDCC-EB26-4FB3-B42B-66516F6C2BFA}"/>
+          </ac:spMkLst>
+        </pc:spChg>
+      </pc:sldChg>
+    </pc:docChg>
+  </pc:docChgLst>
   <pc:docChgLst>
     <pc:chgData name="Darbandi, Hamed (UT-EEMCS)" userId="14c3e4a7-a657-4d7f-849e-8baaf4839630" providerId="ADAL" clId="{72AF2A81-B5F1-4E69-8DE0-BB2C03A25C53}"/>
     <pc:docChg chg="undo redo custSel addSld delSld modSld sldOrd addMainMaster">
@@ -152,30 +176,6 @@
             <pc:docMk/>
             <pc:sldMk cId="3032736796" sldId="257"/>
             <ac:spMk id="8" creationId="{5651C514-C0D7-EDAA-3758-D7777957BD61}"/>
-          </ac:spMkLst>
-        </pc:spChg>
-        <pc:spChg chg="add del">
-          <ac:chgData name="Darbandi, Hamed (UT-EEMCS)" userId="14c3e4a7-a657-4d7f-849e-8baaf4839630" providerId="ADAL" clId="{72AF2A81-B5F1-4E69-8DE0-BB2C03A25C53}" dt="2025-07-28T12:54:13.907" v="108" actId="26606"/>
-          <ac:spMkLst>
-            <pc:docMk/>
-            <pc:sldMk cId="3032736796" sldId="257"/>
-            <ac:spMk id="13" creationId="{B50AB553-2A96-4A92-96F2-93548E096954}"/>
-          </ac:spMkLst>
-        </pc:spChg>
-        <pc:spChg chg="del">
-          <ac:chgData name="Darbandi, Hamed (UT-EEMCS)" userId="14c3e4a7-a657-4d7f-849e-8baaf4839630" providerId="ADAL" clId="{72AF2A81-B5F1-4E69-8DE0-BB2C03A25C53}" dt="2025-07-28T12:49:28.201" v="2" actId="700"/>
-          <ac:spMkLst>
-            <pc:docMk/>
-            <pc:sldMk cId="3032736796" sldId="257"/>
-            <ac:spMk id="15" creationId="{362810D9-2C5A-477D-949C-C191895477F3}"/>
-          </ac:spMkLst>
-        </pc:spChg>
-        <pc:spChg chg="del">
-          <ac:chgData name="Darbandi, Hamed (UT-EEMCS)" userId="14c3e4a7-a657-4d7f-849e-8baaf4839630" providerId="ADAL" clId="{72AF2A81-B5F1-4E69-8DE0-BB2C03A25C53}" dt="2025-07-28T12:49:28.201" v="2" actId="700"/>
-          <ac:spMkLst>
-            <pc:docMk/>
-            <pc:sldMk cId="3032736796" sldId="257"/>
-            <ac:spMk id="17" creationId="{081E4A58-353D-44AE-B2FC-2A74E2E400F7}"/>
           </ac:spMkLst>
         </pc:spChg>
         <pc:graphicFrameChg chg="add mod ord modGraphic">
@@ -208,38 +208,6 @@
           <pc:docMk/>
           <pc:sldMk cId="4052699321" sldId="259"/>
         </pc:sldMkLst>
-        <pc:spChg chg="mod">
-          <ac:chgData name="Darbandi, Hamed (UT-EEMCS)" userId="14c3e4a7-a657-4d7f-849e-8baaf4839630" providerId="ADAL" clId="{72AF2A81-B5F1-4E69-8DE0-BB2C03A25C53}" dt="2025-07-28T12:52:20.129" v="75" actId="26606"/>
-          <ac:spMkLst>
-            <pc:docMk/>
-            <pc:sldMk cId="4052699321" sldId="259"/>
-            <ac:spMk id="8" creationId="{5EE5EF1D-A941-39E2-9210-A680B9B73EAC}"/>
-          </ac:spMkLst>
-        </pc:spChg>
-        <pc:spChg chg="add del">
-          <ac:chgData name="Darbandi, Hamed (UT-EEMCS)" userId="14c3e4a7-a657-4d7f-849e-8baaf4839630" providerId="ADAL" clId="{72AF2A81-B5F1-4E69-8DE0-BB2C03A25C53}" dt="2025-07-28T12:52:20.129" v="75" actId="26606"/>
-          <ac:spMkLst>
-            <pc:docMk/>
-            <pc:sldMk cId="4052699321" sldId="259"/>
-            <ac:spMk id="13" creationId="{B50AB553-2A96-4A92-96F2-93548E096954}"/>
-          </ac:spMkLst>
-        </pc:spChg>
-        <pc:graphicFrameChg chg="mod modGraphic">
-          <ac:chgData name="Darbandi, Hamed (UT-EEMCS)" userId="14c3e4a7-a657-4d7f-849e-8baaf4839630" providerId="ADAL" clId="{72AF2A81-B5F1-4E69-8DE0-BB2C03A25C53}" dt="2025-07-28T12:52:20.129" v="75" actId="26606"/>
-          <ac:graphicFrameMkLst>
-            <pc:docMk/>
-            <pc:sldMk cId="4052699321" sldId="259"/>
-            <ac:graphicFrameMk id="5" creationId="{92EB4022-5430-E85D-66A1-00E8AB5967A9}"/>
-          </ac:graphicFrameMkLst>
-        </pc:graphicFrameChg>
-        <pc:picChg chg="mod">
-          <ac:chgData name="Darbandi, Hamed (UT-EEMCS)" userId="14c3e4a7-a657-4d7f-849e-8baaf4839630" providerId="ADAL" clId="{72AF2A81-B5F1-4E69-8DE0-BB2C03A25C53}" dt="2025-07-28T12:52:20.129" v="75" actId="26606"/>
-          <ac:picMkLst>
-            <pc:docMk/>
-            <pc:sldMk cId="4052699321" sldId="259"/>
-            <ac:picMk id="6" creationId="{9899710B-88EE-E075-E142-39EF83F07975}"/>
-          </ac:picMkLst>
-        </pc:picChg>
       </pc:sldChg>
       <pc:sldChg chg="modSp add del mod">
         <pc:chgData name="Darbandi, Hamed (UT-EEMCS)" userId="14c3e4a7-a657-4d7f-849e-8baaf4839630" providerId="ADAL" clId="{72AF2A81-B5F1-4E69-8DE0-BB2C03A25C53}" dt="2025-07-28T13:49:01.137" v="1020" actId="20577"/>
@@ -285,102 +253,6 @@
           <pc:docMk/>
           <pc:sldMk cId="658376717" sldId="262"/>
         </pc:sldMkLst>
-        <pc:spChg chg="del">
-          <ac:chgData name="Darbandi, Hamed (UT-EEMCS)" userId="14c3e4a7-a657-4d7f-849e-8baaf4839630" providerId="ADAL" clId="{72AF2A81-B5F1-4E69-8DE0-BB2C03A25C53}" dt="2025-07-29T13:10:10.532" v="1089" actId="478"/>
-          <ac:spMkLst>
-            <pc:docMk/>
-            <pc:sldMk cId="658376717" sldId="262"/>
-            <ac:spMk id="2" creationId="{1F7E5F36-0F1B-3180-0CC4-686071EB1E2F}"/>
-          </ac:spMkLst>
-        </pc:spChg>
-        <pc:spChg chg="del">
-          <ac:chgData name="Darbandi, Hamed (UT-EEMCS)" userId="14c3e4a7-a657-4d7f-849e-8baaf4839630" providerId="ADAL" clId="{72AF2A81-B5F1-4E69-8DE0-BB2C03A25C53}" dt="2025-07-29T13:09:28.458" v="1079" actId="931"/>
-          <ac:spMkLst>
-            <pc:docMk/>
-            <pc:sldMk cId="658376717" sldId="262"/>
-            <ac:spMk id="3" creationId="{0E1754E2-B7AA-D78A-1084-47030699D5BD}"/>
-          </ac:spMkLst>
-        </pc:spChg>
-        <pc:spChg chg="add del mod">
-          <ac:chgData name="Darbandi, Hamed (UT-EEMCS)" userId="14c3e4a7-a657-4d7f-849e-8baaf4839630" providerId="ADAL" clId="{72AF2A81-B5F1-4E69-8DE0-BB2C03A25C53}" dt="2025-07-29T13:10:12.386" v="1090" actId="478"/>
-          <ac:spMkLst>
-            <pc:docMk/>
-            <pc:sldMk cId="658376717" sldId="262"/>
-            <ac:spMk id="9" creationId="{8B07D625-7B5B-1FB7-A467-1285FA7299C9}"/>
-          </ac:spMkLst>
-        </pc:spChg>
-        <pc:picChg chg="add del mod">
-          <ac:chgData name="Darbandi, Hamed (UT-EEMCS)" userId="14c3e4a7-a657-4d7f-849e-8baaf4839630" providerId="ADAL" clId="{72AF2A81-B5F1-4E69-8DE0-BB2C03A25C53}" dt="2025-07-29T13:10:07.944" v="1088" actId="478"/>
-          <ac:picMkLst>
-            <pc:docMk/>
-            <pc:sldMk cId="658376717" sldId="262"/>
-            <ac:picMk id="5" creationId="{BC3A4FAE-A4C4-E9EC-82B9-FC4FCE97F96C}"/>
-          </ac:picMkLst>
-        </pc:picChg>
-        <pc:picChg chg="add mod">
-          <ac:chgData name="Darbandi, Hamed (UT-EEMCS)" userId="14c3e4a7-a657-4d7f-849e-8baaf4839630" providerId="ADAL" clId="{72AF2A81-B5F1-4E69-8DE0-BB2C03A25C53}" dt="2025-07-29T13:10:06.508" v="1087" actId="931"/>
-          <ac:picMkLst>
-            <pc:docMk/>
-            <pc:sldMk cId="658376717" sldId="262"/>
-            <ac:picMk id="7" creationId="{4B11D103-227B-361D-5EEF-2A308C6E34E1}"/>
-          </ac:picMkLst>
-        </pc:picChg>
-        <pc:picChg chg="add del mod">
-          <ac:chgData name="Darbandi, Hamed (UT-EEMCS)" userId="14c3e4a7-a657-4d7f-849e-8baaf4839630" providerId="ADAL" clId="{72AF2A81-B5F1-4E69-8DE0-BB2C03A25C53}" dt="2025-07-29T13:13:19.525" v="1124" actId="478"/>
-          <ac:picMkLst>
-            <pc:docMk/>
-            <pc:sldMk cId="658376717" sldId="262"/>
-            <ac:picMk id="11" creationId="{48936987-01A3-F1C2-B6BE-55FA7D8FA408}"/>
-          </ac:picMkLst>
-        </pc:picChg>
-        <pc:picChg chg="add del mod">
-          <ac:chgData name="Darbandi, Hamed (UT-EEMCS)" userId="14c3e4a7-a657-4d7f-849e-8baaf4839630" providerId="ADAL" clId="{72AF2A81-B5F1-4E69-8DE0-BB2C03A25C53}" dt="2025-07-29T13:13:12.920" v="1123" actId="478"/>
-          <ac:picMkLst>
-            <pc:docMk/>
-            <pc:sldMk cId="658376717" sldId="262"/>
-            <ac:picMk id="13" creationId="{37A4E26B-9C86-7C32-8571-208F3F6AFD9F}"/>
-          </ac:picMkLst>
-        </pc:picChg>
-        <pc:picChg chg="add del mod">
-          <ac:chgData name="Darbandi, Hamed (UT-EEMCS)" userId="14c3e4a7-a657-4d7f-849e-8baaf4839630" providerId="ADAL" clId="{72AF2A81-B5F1-4E69-8DE0-BB2C03A25C53}" dt="2025-07-29T13:13:11.686" v="1122" actId="478"/>
-          <ac:picMkLst>
-            <pc:docMk/>
-            <pc:sldMk cId="658376717" sldId="262"/>
-            <ac:picMk id="15" creationId="{1EB1135D-39A9-4E98-1D48-F3E988CDD908}"/>
-          </ac:picMkLst>
-        </pc:picChg>
-        <pc:picChg chg="add del mod">
-          <ac:chgData name="Darbandi, Hamed (UT-EEMCS)" userId="14c3e4a7-a657-4d7f-849e-8baaf4839630" providerId="ADAL" clId="{72AF2A81-B5F1-4E69-8DE0-BB2C03A25C53}" dt="2025-07-29T13:13:10.167" v="1120" actId="478"/>
-          <ac:picMkLst>
-            <pc:docMk/>
-            <pc:sldMk cId="658376717" sldId="262"/>
-            <ac:picMk id="17" creationId="{4DDD9DD2-F37E-BBDB-D819-13E0D890A10D}"/>
-          </ac:picMkLst>
-        </pc:picChg>
-        <pc:picChg chg="add del mod ord">
-          <ac:chgData name="Darbandi, Hamed (UT-EEMCS)" userId="14c3e4a7-a657-4d7f-849e-8baaf4839630" providerId="ADAL" clId="{72AF2A81-B5F1-4E69-8DE0-BB2C03A25C53}" dt="2025-07-29T13:13:11.046" v="1121" actId="478"/>
-          <ac:picMkLst>
-            <pc:docMk/>
-            <pc:sldMk cId="658376717" sldId="262"/>
-            <ac:picMk id="19" creationId="{BE25FDF5-4CD4-C9D8-2AD3-FB438DAC13D4}"/>
-          </ac:picMkLst>
-        </pc:picChg>
-        <pc:picChg chg="add del mod ord">
-          <ac:chgData name="Darbandi, Hamed (UT-EEMCS)" userId="14c3e4a7-a657-4d7f-849e-8baaf4839630" providerId="ADAL" clId="{72AF2A81-B5F1-4E69-8DE0-BB2C03A25C53}" dt="2025-07-29T13:13:20.276" v="1125" actId="478"/>
-          <ac:picMkLst>
-            <pc:docMk/>
-            <pc:sldMk cId="658376717" sldId="262"/>
-            <ac:picMk id="21" creationId="{0838CD85-B09F-EFB3-7C65-D57F684C746C}"/>
-          </ac:picMkLst>
-        </pc:picChg>
-        <pc:picChg chg="add mod">
-          <ac:chgData name="Darbandi, Hamed (UT-EEMCS)" userId="14c3e4a7-a657-4d7f-849e-8baaf4839630" providerId="ADAL" clId="{72AF2A81-B5F1-4E69-8DE0-BB2C03A25C53}" dt="2025-07-29T13:13:42.651" v="1129"/>
-          <ac:picMkLst>
-            <pc:docMk/>
-            <pc:sldMk cId="658376717" sldId="262"/>
-            <ac:picMk id="23" creationId="{6963BDA8-DE3B-0588-F56B-E919E0BC3D76}"/>
-          </ac:picMkLst>
-        </pc:picChg>
       </pc:sldChg>
       <pc:sldChg chg="addSp delSp modSp new mod">
         <pc:chgData name="Darbandi, Hamed (UT-EEMCS)" userId="14c3e4a7-a657-4d7f-849e-8baaf4839630" providerId="ADAL" clId="{72AF2A81-B5F1-4E69-8DE0-BB2C03A25C53}" dt="2025-07-29T13:59:48.554" v="1143" actId="20577"/>
@@ -394,14 +266,6 @@
             <pc:docMk/>
             <pc:sldMk cId="1117176596" sldId="262"/>
             <ac:spMk id="2" creationId="{96887403-1A6D-48AA-DFAB-1649BBA144C7}"/>
-          </ac:spMkLst>
-        </pc:spChg>
-        <pc:spChg chg="del">
-          <ac:chgData name="Darbandi, Hamed (UT-EEMCS)" userId="14c3e4a7-a657-4d7f-849e-8baaf4839630" providerId="ADAL" clId="{72AF2A81-B5F1-4E69-8DE0-BB2C03A25C53}" dt="2025-07-29T13:59:37.849" v="1132"/>
-          <ac:spMkLst>
-            <pc:docMk/>
-            <pc:sldMk cId="1117176596" sldId="262"/>
-            <ac:spMk id="3" creationId="{748D379C-4C2C-CAF9-0016-A2FAE066E4F3}"/>
           </ac:spMkLst>
         </pc:spChg>
         <pc:picChg chg="add mod">
@@ -8053,7 +7917,7 @@
           <a:p>
             <a:fld id="{DC11B0E6-9697-40A3-AD93-37D4A7A41591}" type="datetimeFigureOut">
               <a:rPr lang="en-US" smtClean="0"/>
-              <a:t>7/29/2025</a:t>
+              <a:t>8/27/2025</a:t>
             </a:fld>
             <a:endParaRPr lang="en-US"/>
           </a:p>
@@ -8251,7 +8115,7 @@
           <a:p>
             <a:fld id="{DC11B0E6-9697-40A3-AD93-37D4A7A41591}" type="datetimeFigureOut">
               <a:rPr lang="en-US" smtClean="0"/>
-              <a:t>7/29/2025</a:t>
+              <a:t>8/27/2025</a:t>
             </a:fld>
             <a:endParaRPr lang="en-US"/>
           </a:p>
@@ -8459,7 +8323,7 @@
           <a:p>
             <a:fld id="{DC11B0E6-9697-40A3-AD93-37D4A7A41591}" type="datetimeFigureOut">
               <a:rPr lang="en-US" smtClean="0"/>
-              <a:t>7/29/2025</a:t>
+              <a:t>8/27/2025</a:t>
             </a:fld>
             <a:endParaRPr lang="en-US"/>
           </a:p>
@@ -8681,7 +8545,7 @@
           <a:p>
             <a:fld id="{4830D67E-D22D-4A4C-9B3A-26181A3C2579}" type="datetimeFigureOut">
               <a:rPr lang="nl-NL" smtClean="0"/>
-              <a:t>29-7-2025</a:t>
+              <a:t>27-8-2025</a:t>
             </a:fld>
             <a:endParaRPr lang="nl-NL"/>
           </a:p>
@@ -8879,7 +8743,7 @@
           <a:p>
             <a:fld id="{DC11B0E6-9697-40A3-AD93-37D4A7A41591}" type="datetimeFigureOut">
               <a:rPr lang="en-US" smtClean="0"/>
-              <a:t>7/29/2025</a:t>
+              <a:t>8/27/2025</a:t>
             </a:fld>
             <a:endParaRPr lang="en-US"/>
           </a:p>
@@ -9154,7 +9018,7 @@
           <a:p>
             <a:fld id="{DC11B0E6-9697-40A3-AD93-37D4A7A41591}" type="datetimeFigureOut">
               <a:rPr lang="en-US" smtClean="0"/>
-              <a:t>7/29/2025</a:t>
+              <a:t>8/27/2025</a:t>
             </a:fld>
             <a:endParaRPr lang="en-US"/>
           </a:p>
@@ -9419,7 +9283,7 @@
           <a:p>
             <a:fld id="{DC11B0E6-9697-40A3-AD93-37D4A7A41591}" type="datetimeFigureOut">
               <a:rPr lang="en-US" smtClean="0"/>
-              <a:t>7/29/2025</a:t>
+              <a:t>8/27/2025</a:t>
             </a:fld>
             <a:endParaRPr lang="en-US"/>
           </a:p>
@@ -9831,7 +9695,7 @@
           <a:p>
             <a:fld id="{DC11B0E6-9697-40A3-AD93-37D4A7A41591}" type="datetimeFigureOut">
               <a:rPr lang="en-US" smtClean="0"/>
-              <a:t>7/29/2025</a:t>
+              <a:t>8/27/2025</a:t>
             </a:fld>
             <a:endParaRPr lang="en-US"/>
           </a:p>
@@ -9972,7 +9836,7 @@
           <a:p>
             <a:fld id="{DC11B0E6-9697-40A3-AD93-37D4A7A41591}" type="datetimeFigureOut">
               <a:rPr lang="en-US" smtClean="0"/>
-              <a:t>7/29/2025</a:t>
+              <a:t>8/27/2025</a:t>
             </a:fld>
             <a:endParaRPr lang="en-US"/>
           </a:p>
@@ -10085,7 +9949,7 @@
           <a:p>
             <a:fld id="{DC11B0E6-9697-40A3-AD93-37D4A7A41591}" type="datetimeFigureOut">
               <a:rPr lang="en-US" smtClean="0"/>
-              <a:t>7/29/2025</a:t>
+              <a:t>8/27/2025</a:t>
             </a:fld>
             <a:endParaRPr lang="en-US"/>
           </a:p>
@@ -10396,7 +10260,7 @@
           <a:p>
             <a:fld id="{DC11B0E6-9697-40A3-AD93-37D4A7A41591}" type="datetimeFigureOut">
               <a:rPr lang="en-US" smtClean="0"/>
-              <a:t>7/29/2025</a:t>
+              <a:t>8/27/2025</a:t>
             </a:fld>
             <a:endParaRPr lang="en-US"/>
           </a:p>
@@ -10684,7 +10548,7 @@
           <a:p>
             <a:fld id="{DC11B0E6-9697-40A3-AD93-37D4A7A41591}" type="datetimeFigureOut">
               <a:rPr lang="en-US" smtClean="0"/>
-              <a:t>7/29/2025</a:t>
+              <a:t>8/27/2025</a:t>
             </a:fld>
             <a:endParaRPr lang="en-US"/>
           </a:p>
@@ -10925,7 +10789,7 @@
           <a:p>
             <a:fld id="{DC11B0E6-9697-40A3-AD93-37D4A7A41591}" type="datetimeFigureOut">
               <a:rPr lang="en-US" smtClean="0"/>
-              <a:t>7/29/2025</a:t>
+              <a:t>8/27/2025</a:t>
             </a:fld>
             <a:endParaRPr lang="en-US"/>
           </a:p>
@@ -11383,7 +11247,7 @@
           <a:p>
             <a:fld id="{8E469526-6E45-7F42-9A5B-A968FB10F2EF}" type="datetime3">
               <a:rPr lang="en-US" smtClean="0"/>
-              <a:t>29 July 2025</a:t>
+              <a:t>27 August 2025</a:t>
             </a:fld>
             <a:endParaRPr lang="en-US" dirty="0"/>
           </a:p>
@@ -11842,73 +11706,62 @@
               </a:lnSpc>
             </a:pPr>
             <a:r>
-              <a:rPr kumimoji="0" lang="en-US" sz="4000" b="1" i="0" u="none" strike="noStrike" kern="1200" cap="none" spc="0" normalizeH="0" baseline="0" noProof="0" dirty="0">
-                <a:ln>
-                  <a:noFill/>
-                </a:ln>
-                <a:effectLst/>
-                <a:uLnTx/>
-                <a:uFillTx/>
+              <a:rPr lang="en-US" sz="4000" cap="none" dirty="0">
                 <a:latin typeface="Garamond" panose="02020404030301010803" pitchFamily="18" charset="0"/>
-                <a:ea typeface="+mj-ea"/>
-                <a:cs typeface="+mj-cs"/>
               </a:rPr>
-              <a:t>Energy Management for Train Operation</a:t>
+              <a:t>Dynamic Coordination </a:t>
+            </a:r>
+            <a:r>
+              <a:rPr lang="en-US" sz="4000" cap="none">
+                <a:latin typeface="Garamond" panose="02020404030301010803" pitchFamily="18" charset="0"/>
+              </a:rPr>
+              <a:t>of </a:t>
             </a:r>
             <a:br>
-              <a:rPr kumimoji="0" lang="en-US" sz="4000" b="1" i="0" u="none" strike="noStrike" kern="1200" cap="none" spc="0" normalizeH="0" baseline="0" noProof="0" dirty="0">
-                <a:ln>
-                  <a:noFill/>
-                </a:ln>
-                <a:effectLst/>
-                <a:uLnTx/>
-                <a:uFillTx/>
+              <a:rPr lang="en-US" sz="4000" cap="none">
                 <a:latin typeface="Garamond" panose="02020404030301010803" pitchFamily="18" charset="0"/>
-                <a:ea typeface="+mj-ea"/>
-                <a:cs typeface="+mj-cs"/>
               </a:rPr>
             </a:br>
             <a:r>
-              <a:rPr kumimoji="0" lang="en-US" sz="2800" b="1" i="0" u="none" strike="noStrike" kern="1200" cap="none" spc="0" normalizeH="0" baseline="0" noProof="0" dirty="0">
-                <a:ln>
-                  <a:noFill/>
-                </a:ln>
-                <a:effectLst/>
-                <a:uLnTx/>
-                <a:uFillTx/>
+              <a:rPr lang="en-US" sz="4000" cap="none">
                 <a:latin typeface="Garamond" panose="02020404030301010803" pitchFamily="18" charset="0"/>
-                <a:ea typeface="+mj-ea"/>
-                <a:cs typeface="+mj-cs"/>
               </a:rPr>
-              <a:t> </a:t>
+              <a:t>Train </a:t>
             </a:r>
             <a:r>
-              <a:rPr kumimoji="0" lang="en-US" sz="3200" b="1" i="0" u="none" strike="noStrike" kern="1200" cap="none" spc="0" normalizeH="0" baseline="0" noProof="0" dirty="0">
-                <a:ln>
-                  <a:noFill/>
-                </a:ln>
-                <a:effectLst/>
-                <a:uLnTx/>
-                <a:uFillTx/>
+              <a:rPr lang="en-US" sz="4000" cap="none" dirty="0">
                 <a:latin typeface="Garamond" panose="02020404030301010803" pitchFamily="18" charset="0"/>
-                <a:ea typeface="+mj-ea"/>
-                <a:cs typeface="+mj-cs"/>
               </a:rPr>
-              <a:t>in a </a:t>
+              <a:t>Operations and Energy </a:t>
             </a:r>
             <a:r>
-              <a:rPr kumimoji="0" lang="en-US" sz="3200" b="1" i="0" u="none" strike="noStrike" kern="1200" cap="none" spc="0" normalizeH="0" baseline="0" noProof="0">
-                <a:ln>
-                  <a:noFill/>
-                </a:ln>
-                <a:effectLst/>
-                <a:uLnTx/>
-                <a:uFillTx/>
+              <a:rPr lang="en-US" sz="4000" cap="none">
                 <a:latin typeface="Garamond" panose="02020404030301010803" pitchFamily="18" charset="0"/>
-                <a:ea typeface="+mj-ea"/>
-                <a:cs typeface="+mj-cs"/>
               </a:rPr>
-              <a:t>Sustainable Environment</a:t>
+              <a:t>Assets </a:t>
+            </a:r>
+            <a:br>
+              <a:rPr lang="en-US" sz="4000" cap="none">
+                <a:latin typeface="Garamond" panose="02020404030301010803" pitchFamily="18" charset="0"/>
+              </a:rPr>
+            </a:br>
+            <a:r>
+              <a:rPr lang="en-US" sz="4000" cap="none">
+                <a:latin typeface="Garamond" panose="02020404030301010803" pitchFamily="18" charset="0"/>
+              </a:rPr>
+              <a:t>for Grid </a:t>
+            </a:r>
+            <a:r>
+              <a:rPr lang="en-US" sz="4000" cap="none" dirty="0">
+                <a:latin typeface="Garamond" panose="02020404030301010803" pitchFamily="18" charset="0"/>
+              </a:rPr>
+              <a:t>Support and </a:t>
+            </a:r>
+            <a:r>
+              <a:rPr lang="en-US" sz="4000" cap="none">
+                <a:latin typeface="Garamond" panose="02020404030301010803" pitchFamily="18" charset="0"/>
+              </a:rPr>
+              <a:t>Peak Shaving</a:t>
             </a:r>
             <a:endParaRPr lang="nl-NL" dirty="0"/>
           </a:p>

</xml_diff>